<commit_message>
220808C: Tarjan's Cut Vertex & Edge
</commit_message>
<xml_diff>
--- a/DSA_python/figure/python_DSA_fig.pptx
+++ b/DSA_python/figure/python_DSA_fig.pptx
@@ -15,6 +15,7 @@
     <p:sldId id="264" r:id="rId9"/>
     <p:sldId id="265" r:id="rId10"/>
     <p:sldId id="266" r:id="rId11"/>
+    <p:sldId id="267" r:id="rId12"/>
   </p:sldIdLst>
   <p:sldSz cx="12192000" cy="6858000"/>
   <p:notesSz cx="6858000" cy="9144000"/>
@@ -122,12 +123,21 @@
             <p14:sldId id="258"/>
             <p14:sldId id="257"/>
             <p14:sldId id="259"/>
+          </p14:sldIdLst>
+        </p14:section>
+        <p14:section name="Tarjan SCC" id="{328E8836-4367-4478-BB2A-AEA8B85251F3}">
+          <p14:sldIdLst>
             <p14:sldId id="261"/>
             <p14:sldId id="262"/>
             <p14:sldId id="263"/>
             <p14:sldId id="264"/>
             <p14:sldId id="265"/>
             <p14:sldId id="266"/>
+          </p14:sldIdLst>
+        </p14:section>
+        <p14:section name="Cut Vertices" id="{63F99788-8463-40B9-81F2-A7048953D839}">
+          <p14:sldIdLst>
+            <p14:sldId id="267"/>
           </p14:sldIdLst>
         </p14:section>
       </p14:sectionLst>
@@ -6588,6 +6598,971 @@
 </p:sld>
 </file>
 
+<file path=ppt/slides/slide11.xml><?xml version="1.0" encoding="utf-8"?>
+<p:sld xmlns:a="http://schemas.openxmlformats.org/drawingml/2006/main" xmlns:r="http://schemas.openxmlformats.org/officeDocument/2006/relationships" xmlns:p="http://schemas.openxmlformats.org/presentationml/2006/main">
+  <p:cSld>
+    <p:spTree>
+      <p:nvGrpSpPr>
+        <p:cNvPr id="1" name=""/>
+        <p:cNvGrpSpPr/>
+        <p:nvPr/>
+      </p:nvGrpSpPr>
+      <p:grpSpPr>
+        <a:xfrm>
+          <a:off x="0" y="0"/>
+          <a:ext cx="0" cy="0"/>
+          <a:chOff x="0" y="0"/>
+          <a:chExt cx="0" cy="0"/>
+        </a:xfrm>
+      </p:grpSpPr>
+      <p:sp>
+        <p:nvSpPr>
+          <p:cNvPr id="4" name="椭圆 3">
+            <a:extLst>
+              <a:ext uri="{FF2B5EF4-FFF2-40B4-BE49-F238E27FC236}">
+                <a16:creationId xmlns:a16="http://schemas.microsoft.com/office/drawing/2014/main" id="{51103FBD-A79B-46E6-8387-801DE2A98524}"/>
+              </a:ext>
+            </a:extLst>
+          </p:cNvPr>
+          <p:cNvSpPr/>
+          <p:nvPr/>
+        </p:nvSpPr>
+        <p:spPr>
+          <a:xfrm>
+            <a:off x="2000707" y="1917201"/>
+            <a:ext cx="548640" cy="548640"/>
+          </a:xfrm>
+          <a:prstGeom prst="ellipse">
+            <a:avLst/>
+          </a:prstGeom>
+          <a:noFill/>
+          <a:ln>
+            <a:solidFill>
+              <a:schemeClr val="tx1"/>
+            </a:solidFill>
+          </a:ln>
+        </p:spPr>
+        <p:style>
+          <a:lnRef idx="2">
+            <a:schemeClr val="accent1">
+              <a:shade val="50000"/>
+            </a:schemeClr>
+          </a:lnRef>
+          <a:fillRef idx="1">
+            <a:schemeClr val="accent1"/>
+          </a:fillRef>
+          <a:effectRef idx="0">
+            <a:schemeClr val="accent1"/>
+          </a:effectRef>
+          <a:fontRef idx="minor">
+            <a:schemeClr val="lt1"/>
+          </a:fontRef>
+        </p:style>
+        <p:txBody>
+          <a:bodyPr rtlCol="0" anchor="ctr"/>
+          <a:lstStyle/>
+          <a:p>
+            <a:pPr algn="ctr"/>
+            <a:r>
+              <a:rPr lang="en-US" altLang="zh-CN" dirty="0">
+                <a:solidFill>
+                  <a:schemeClr val="tx1"/>
+                </a:solidFill>
+                <a:latin typeface="Times New Roman" panose="02020603050405020304" pitchFamily="18" charset="0"/>
+                <a:cs typeface="Times New Roman" panose="02020603050405020304" pitchFamily="18" charset="0"/>
+              </a:rPr>
+              <a:t>A</a:t>
+            </a:r>
+            <a:endParaRPr lang="zh-CN" altLang="en-US" dirty="0">
+              <a:solidFill>
+                <a:schemeClr val="tx1"/>
+              </a:solidFill>
+              <a:latin typeface="Times New Roman" panose="02020603050405020304" pitchFamily="18" charset="0"/>
+              <a:cs typeface="Times New Roman" panose="02020603050405020304" pitchFamily="18" charset="0"/>
+            </a:endParaRPr>
+          </a:p>
+        </p:txBody>
+      </p:sp>
+      <p:sp>
+        <p:nvSpPr>
+          <p:cNvPr id="15" name="椭圆 14">
+            <a:extLst>
+              <a:ext uri="{FF2B5EF4-FFF2-40B4-BE49-F238E27FC236}">
+                <a16:creationId xmlns:a16="http://schemas.microsoft.com/office/drawing/2014/main" id="{028FE1EA-88B3-45AD-A5A0-08861936F1ED}"/>
+              </a:ext>
+            </a:extLst>
+          </p:cNvPr>
+          <p:cNvSpPr/>
+          <p:nvPr/>
+        </p:nvSpPr>
+        <p:spPr>
+          <a:xfrm>
+            <a:off x="2095481" y="3711406"/>
+            <a:ext cx="548640" cy="548640"/>
+          </a:xfrm>
+          <a:prstGeom prst="ellipse">
+            <a:avLst/>
+          </a:prstGeom>
+          <a:noFill/>
+          <a:ln>
+            <a:solidFill>
+              <a:schemeClr val="tx1"/>
+            </a:solidFill>
+          </a:ln>
+        </p:spPr>
+        <p:style>
+          <a:lnRef idx="2">
+            <a:schemeClr val="accent1">
+              <a:shade val="50000"/>
+            </a:schemeClr>
+          </a:lnRef>
+          <a:fillRef idx="1">
+            <a:schemeClr val="accent1"/>
+          </a:fillRef>
+          <a:effectRef idx="0">
+            <a:schemeClr val="accent1"/>
+          </a:effectRef>
+          <a:fontRef idx="minor">
+            <a:schemeClr val="lt1"/>
+          </a:fontRef>
+        </p:style>
+        <p:txBody>
+          <a:bodyPr rtlCol="0" anchor="ctr"/>
+          <a:lstStyle/>
+          <a:p>
+            <a:pPr algn="ctr"/>
+            <a:r>
+              <a:rPr lang="en-US" altLang="zh-CN" dirty="0">
+                <a:solidFill>
+                  <a:schemeClr val="tx1"/>
+                </a:solidFill>
+                <a:latin typeface="Times New Roman" panose="02020603050405020304" pitchFamily="18" charset="0"/>
+                <a:cs typeface="Times New Roman" panose="02020603050405020304" pitchFamily="18" charset="0"/>
+              </a:rPr>
+              <a:t>B</a:t>
+            </a:r>
+            <a:endParaRPr lang="zh-CN" altLang="en-US" dirty="0">
+              <a:solidFill>
+                <a:schemeClr val="tx1"/>
+              </a:solidFill>
+              <a:latin typeface="Times New Roman" panose="02020603050405020304" pitchFamily="18" charset="0"/>
+              <a:cs typeface="Times New Roman" panose="02020603050405020304" pitchFamily="18" charset="0"/>
+            </a:endParaRPr>
+          </a:p>
+        </p:txBody>
+      </p:sp>
+      <p:sp>
+        <p:nvSpPr>
+          <p:cNvPr id="16" name="椭圆 15">
+            <a:extLst>
+              <a:ext uri="{FF2B5EF4-FFF2-40B4-BE49-F238E27FC236}">
+                <a16:creationId xmlns:a16="http://schemas.microsoft.com/office/drawing/2014/main" id="{0165B1C4-996C-47CE-83FB-22C4052FB337}"/>
+              </a:ext>
+            </a:extLst>
+          </p:cNvPr>
+          <p:cNvSpPr/>
+          <p:nvPr/>
+        </p:nvSpPr>
+        <p:spPr>
+          <a:xfrm>
+            <a:off x="4587465" y="3782539"/>
+            <a:ext cx="548640" cy="548640"/>
+          </a:xfrm>
+          <a:prstGeom prst="ellipse">
+            <a:avLst/>
+          </a:prstGeom>
+          <a:noFill/>
+          <a:ln>
+            <a:solidFill>
+              <a:schemeClr val="tx1"/>
+            </a:solidFill>
+          </a:ln>
+        </p:spPr>
+        <p:style>
+          <a:lnRef idx="2">
+            <a:schemeClr val="accent1">
+              <a:shade val="50000"/>
+            </a:schemeClr>
+          </a:lnRef>
+          <a:fillRef idx="1">
+            <a:schemeClr val="accent1"/>
+          </a:fillRef>
+          <a:effectRef idx="0">
+            <a:schemeClr val="accent1"/>
+          </a:effectRef>
+          <a:fontRef idx="minor">
+            <a:schemeClr val="lt1"/>
+          </a:fontRef>
+        </p:style>
+        <p:txBody>
+          <a:bodyPr rtlCol="0" anchor="ctr"/>
+          <a:lstStyle/>
+          <a:p>
+            <a:pPr algn="ctr"/>
+            <a:r>
+              <a:rPr lang="en-US" altLang="zh-CN" dirty="0">
+                <a:solidFill>
+                  <a:schemeClr val="tx1"/>
+                </a:solidFill>
+                <a:latin typeface="Times New Roman" panose="02020603050405020304" pitchFamily="18" charset="0"/>
+                <a:cs typeface="Times New Roman" panose="02020603050405020304" pitchFamily="18" charset="0"/>
+              </a:rPr>
+              <a:t>C</a:t>
+            </a:r>
+            <a:endParaRPr lang="zh-CN" altLang="en-US" dirty="0">
+              <a:solidFill>
+                <a:schemeClr val="tx1"/>
+              </a:solidFill>
+              <a:latin typeface="Times New Roman" panose="02020603050405020304" pitchFamily="18" charset="0"/>
+              <a:cs typeface="Times New Roman" panose="02020603050405020304" pitchFamily="18" charset="0"/>
+            </a:endParaRPr>
+          </a:p>
+        </p:txBody>
+      </p:sp>
+      <p:sp>
+        <p:nvSpPr>
+          <p:cNvPr id="17" name="椭圆 16">
+            <a:extLst>
+              <a:ext uri="{FF2B5EF4-FFF2-40B4-BE49-F238E27FC236}">
+                <a16:creationId xmlns:a16="http://schemas.microsoft.com/office/drawing/2014/main" id="{99DAA856-C124-4E74-AC01-3F1C66FA296F}"/>
+              </a:ext>
+            </a:extLst>
+          </p:cNvPr>
+          <p:cNvSpPr/>
+          <p:nvPr/>
+        </p:nvSpPr>
+        <p:spPr>
+          <a:xfrm>
+            <a:off x="4587465" y="1978182"/>
+            <a:ext cx="548640" cy="548640"/>
+          </a:xfrm>
+          <a:prstGeom prst="ellipse">
+            <a:avLst/>
+          </a:prstGeom>
+          <a:solidFill>
+            <a:schemeClr val="accent4">
+              <a:lumMod val="60000"/>
+              <a:lumOff val="40000"/>
+            </a:schemeClr>
+          </a:solidFill>
+          <a:ln>
+            <a:solidFill>
+              <a:schemeClr val="tx1"/>
+            </a:solidFill>
+          </a:ln>
+        </p:spPr>
+        <p:style>
+          <a:lnRef idx="2">
+            <a:schemeClr val="accent1">
+              <a:shade val="50000"/>
+            </a:schemeClr>
+          </a:lnRef>
+          <a:fillRef idx="1">
+            <a:schemeClr val="accent1"/>
+          </a:fillRef>
+          <a:effectRef idx="0">
+            <a:schemeClr val="accent1"/>
+          </a:effectRef>
+          <a:fontRef idx="minor">
+            <a:schemeClr val="lt1"/>
+          </a:fontRef>
+        </p:style>
+        <p:txBody>
+          <a:bodyPr rtlCol="0" anchor="ctr"/>
+          <a:lstStyle/>
+          <a:p>
+            <a:pPr algn="ctr"/>
+            <a:r>
+              <a:rPr lang="en-US" altLang="zh-CN" dirty="0">
+                <a:solidFill>
+                  <a:schemeClr val="tx1"/>
+                </a:solidFill>
+                <a:latin typeface="Times New Roman" panose="02020603050405020304" pitchFamily="18" charset="0"/>
+                <a:cs typeface="Times New Roman" panose="02020603050405020304" pitchFamily="18" charset="0"/>
+              </a:rPr>
+              <a:t>D</a:t>
+            </a:r>
+            <a:endParaRPr lang="zh-CN" altLang="en-US" dirty="0">
+              <a:solidFill>
+                <a:schemeClr val="tx1"/>
+              </a:solidFill>
+              <a:latin typeface="Times New Roman" panose="02020603050405020304" pitchFamily="18" charset="0"/>
+              <a:cs typeface="Times New Roman" panose="02020603050405020304" pitchFamily="18" charset="0"/>
+            </a:endParaRPr>
+          </a:p>
+        </p:txBody>
+      </p:sp>
+      <p:sp>
+        <p:nvSpPr>
+          <p:cNvPr id="18" name="椭圆 17">
+            <a:extLst>
+              <a:ext uri="{FF2B5EF4-FFF2-40B4-BE49-F238E27FC236}">
+                <a16:creationId xmlns:a16="http://schemas.microsoft.com/office/drawing/2014/main" id="{CF03CC9C-F817-4723-8B0E-374876704F13}"/>
+              </a:ext>
+            </a:extLst>
+          </p:cNvPr>
+          <p:cNvSpPr/>
+          <p:nvPr/>
+        </p:nvSpPr>
+        <p:spPr>
+          <a:xfrm>
+            <a:off x="6230508" y="1866435"/>
+            <a:ext cx="548640" cy="548640"/>
+          </a:xfrm>
+          <a:prstGeom prst="ellipse">
+            <a:avLst/>
+          </a:prstGeom>
+          <a:solidFill>
+            <a:schemeClr val="accent4">
+              <a:lumMod val="60000"/>
+              <a:lumOff val="40000"/>
+            </a:schemeClr>
+          </a:solidFill>
+          <a:ln>
+            <a:solidFill>
+              <a:schemeClr val="tx1"/>
+            </a:solidFill>
+          </a:ln>
+        </p:spPr>
+        <p:style>
+          <a:lnRef idx="2">
+            <a:schemeClr val="accent1">
+              <a:shade val="50000"/>
+            </a:schemeClr>
+          </a:lnRef>
+          <a:fillRef idx="1">
+            <a:schemeClr val="accent1"/>
+          </a:fillRef>
+          <a:effectRef idx="0">
+            <a:schemeClr val="accent1"/>
+          </a:effectRef>
+          <a:fontRef idx="minor">
+            <a:schemeClr val="lt1"/>
+          </a:fontRef>
+        </p:style>
+        <p:txBody>
+          <a:bodyPr rtlCol="0" anchor="ctr"/>
+          <a:lstStyle/>
+          <a:p>
+            <a:pPr algn="ctr"/>
+            <a:r>
+              <a:rPr lang="en-US" altLang="zh-CN" dirty="0">
+                <a:solidFill>
+                  <a:schemeClr val="tx1"/>
+                </a:solidFill>
+                <a:latin typeface="Times New Roman" panose="02020603050405020304" pitchFamily="18" charset="0"/>
+                <a:cs typeface="Times New Roman" panose="02020603050405020304" pitchFamily="18" charset="0"/>
+              </a:rPr>
+              <a:t>E</a:t>
+            </a:r>
+            <a:endParaRPr lang="zh-CN" altLang="en-US" dirty="0">
+              <a:solidFill>
+                <a:schemeClr val="tx1"/>
+              </a:solidFill>
+              <a:latin typeface="Times New Roman" panose="02020603050405020304" pitchFamily="18" charset="0"/>
+              <a:cs typeface="Times New Roman" panose="02020603050405020304" pitchFamily="18" charset="0"/>
+            </a:endParaRPr>
+          </a:p>
+        </p:txBody>
+      </p:sp>
+      <p:sp>
+        <p:nvSpPr>
+          <p:cNvPr id="19" name="椭圆 18">
+            <a:extLst>
+              <a:ext uri="{FF2B5EF4-FFF2-40B4-BE49-F238E27FC236}">
+                <a16:creationId xmlns:a16="http://schemas.microsoft.com/office/drawing/2014/main" id="{13B74924-57F6-4B57-814F-62AE3C813568}"/>
+              </a:ext>
+            </a:extLst>
+          </p:cNvPr>
+          <p:cNvSpPr/>
+          <p:nvPr/>
+        </p:nvSpPr>
+        <p:spPr>
+          <a:xfrm>
+            <a:off x="9995196" y="2780835"/>
+            <a:ext cx="548640" cy="548640"/>
+          </a:xfrm>
+          <a:prstGeom prst="ellipse">
+            <a:avLst/>
+          </a:prstGeom>
+          <a:noFill/>
+          <a:ln>
+            <a:solidFill>
+              <a:schemeClr val="tx1"/>
+            </a:solidFill>
+          </a:ln>
+        </p:spPr>
+        <p:style>
+          <a:lnRef idx="2">
+            <a:schemeClr val="accent1">
+              <a:shade val="50000"/>
+            </a:schemeClr>
+          </a:lnRef>
+          <a:fillRef idx="1">
+            <a:schemeClr val="accent1"/>
+          </a:fillRef>
+          <a:effectRef idx="0">
+            <a:schemeClr val="accent1"/>
+          </a:effectRef>
+          <a:fontRef idx="minor">
+            <a:schemeClr val="lt1"/>
+          </a:fontRef>
+        </p:style>
+        <p:txBody>
+          <a:bodyPr rtlCol="0" anchor="ctr"/>
+          <a:lstStyle/>
+          <a:p>
+            <a:pPr algn="ctr"/>
+            <a:r>
+              <a:rPr lang="en-US" altLang="zh-CN" dirty="0">
+                <a:solidFill>
+                  <a:schemeClr val="tx1"/>
+                </a:solidFill>
+                <a:latin typeface="Times New Roman" panose="02020603050405020304" pitchFamily="18" charset="0"/>
+                <a:cs typeface="Times New Roman" panose="02020603050405020304" pitchFamily="18" charset="0"/>
+              </a:rPr>
+              <a:t>H</a:t>
+            </a:r>
+            <a:endParaRPr lang="zh-CN" altLang="en-US" dirty="0">
+              <a:solidFill>
+                <a:schemeClr val="tx1"/>
+              </a:solidFill>
+              <a:latin typeface="Times New Roman" panose="02020603050405020304" pitchFamily="18" charset="0"/>
+              <a:cs typeface="Times New Roman" panose="02020603050405020304" pitchFamily="18" charset="0"/>
+            </a:endParaRPr>
+          </a:p>
+        </p:txBody>
+      </p:sp>
+      <p:sp>
+        <p:nvSpPr>
+          <p:cNvPr id="20" name="椭圆 19">
+            <a:extLst>
+              <a:ext uri="{FF2B5EF4-FFF2-40B4-BE49-F238E27FC236}">
+                <a16:creationId xmlns:a16="http://schemas.microsoft.com/office/drawing/2014/main" id="{73F7C747-3324-48E7-AB6E-45622A983736}"/>
+              </a:ext>
+            </a:extLst>
+          </p:cNvPr>
+          <p:cNvSpPr/>
+          <p:nvPr/>
+        </p:nvSpPr>
+        <p:spPr>
+          <a:xfrm>
+            <a:off x="8409585" y="3620839"/>
+            <a:ext cx="548640" cy="548640"/>
+          </a:xfrm>
+          <a:prstGeom prst="ellipse">
+            <a:avLst/>
+          </a:prstGeom>
+          <a:noFill/>
+          <a:ln>
+            <a:solidFill>
+              <a:schemeClr val="tx1"/>
+            </a:solidFill>
+          </a:ln>
+        </p:spPr>
+        <p:style>
+          <a:lnRef idx="2">
+            <a:schemeClr val="accent1">
+              <a:shade val="50000"/>
+            </a:schemeClr>
+          </a:lnRef>
+          <a:fillRef idx="1">
+            <a:schemeClr val="accent1"/>
+          </a:fillRef>
+          <a:effectRef idx="0">
+            <a:schemeClr val="accent1"/>
+          </a:effectRef>
+          <a:fontRef idx="minor">
+            <a:schemeClr val="lt1"/>
+          </a:fontRef>
+        </p:style>
+        <p:txBody>
+          <a:bodyPr rtlCol="0" anchor="ctr"/>
+          <a:lstStyle/>
+          <a:p>
+            <a:pPr algn="ctr"/>
+            <a:r>
+              <a:rPr lang="en-US" altLang="zh-CN" dirty="0">
+                <a:solidFill>
+                  <a:schemeClr val="tx1"/>
+                </a:solidFill>
+                <a:latin typeface="Times New Roman" panose="02020603050405020304" pitchFamily="18" charset="0"/>
+                <a:cs typeface="Times New Roman" panose="02020603050405020304" pitchFamily="18" charset="0"/>
+              </a:rPr>
+              <a:t>G</a:t>
+            </a:r>
+            <a:endParaRPr lang="zh-CN" altLang="en-US" dirty="0">
+              <a:solidFill>
+                <a:schemeClr val="tx1"/>
+              </a:solidFill>
+              <a:latin typeface="Times New Roman" panose="02020603050405020304" pitchFamily="18" charset="0"/>
+              <a:cs typeface="Times New Roman" panose="02020603050405020304" pitchFamily="18" charset="0"/>
+            </a:endParaRPr>
+          </a:p>
+        </p:txBody>
+      </p:sp>
+      <p:sp>
+        <p:nvSpPr>
+          <p:cNvPr id="21" name="椭圆 20">
+            <a:extLst>
+              <a:ext uri="{FF2B5EF4-FFF2-40B4-BE49-F238E27FC236}">
+                <a16:creationId xmlns:a16="http://schemas.microsoft.com/office/drawing/2014/main" id="{301C54E2-31ED-418B-9E95-2DFABBD4271E}"/>
+              </a:ext>
+            </a:extLst>
+          </p:cNvPr>
+          <p:cNvSpPr/>
+          <p:nvPr/>
+        </p:nvSpPr>
+        <p:spPr>
+          <a:xfrm>
+            <a:off x="8419314" y="1917201"/>
+            <a:ext cx="548640" cy="548640"/>
+          </a:xfrm>
+          <a:prstGeom prst="ellipse">
+            <a:avLst/>
+          </a:prstGeom>
+          <a:solidFill>
+            <a:schemeClr val="accent4">
+              <a:lumMod val="60000"/>
+              <a:lumOff val="40000"/>
+            </a:schemeClr>
+          </a:solidFill>
+          <a:ln>
+            <a:solidFill>
+              <a:schemeClr val="tx1"/>
+            </a:solidFill>
+          </a:ln>
+        </p:spPr>
+        <p:style>
+          <a:lnRef idx="2">
+            <a:schemeClr val="accent1">
+              <a:shade val="50000"/>
+            </a:schemeClr>
+          </a:lnRef>
+          <a:fillRef idx="1">
+            <a:schemeClr val="accent1"/>
+          </a:fillRef>
+          <a:effectRef idx="0">
+            <a:schemeClr val="accent1"/>
+          </a:effectRef>
+          <a:fontRef idx="minor">
+            <a:schemeClr val="lt1"/>
+          </a:fontRef>
+        </p:style>
+        <p:txBody>
+          <a:bodyPr rtlCol="0" anchor="ctr"/>
+          <a:lstStyle/>
+          <a:p>
+            <a:pPr algn="ctr"/>
+            <a:r>
+              <a:rPr lang="en-US" altLang="zh-CN" dirty="0">
+                <a:solidFill>
+                  <a:schemeClr val="tx1"/>
+                </a:solidFill>
+                <a:latin typeface="Times New Roman" panose="02020603050405020304" pitchFamily="18" charset="0"/>
+                <a:cs typeface="Times New Roman" panose="02020603050405020304" pitchFamily="18" charset="0"/>
+              </a:rPr>
+              <a:t>F</a:t>
+            </a:r>
+            <a:endParaRPr lang="zh-CN" altLang="en-US" dirty="0">
+              <a:solidFill>
+                <a:schemeClr val="tx1"/>
+              </a:solidFill>
+              <a:latin typeface="Times New Roman" panose="02020603050405020304" pitchFamily="18" charset="0"/>
+              <a:cs typeface="Times New Roman" panose="02020603050405020304" pitchFamily="18" charset="0"/>
+            </a:endParaRPr>
+          </a:p>
+        </p:txBody>
+      </p:sp>
+      <p:cxnSp>
+        <p:nvCxnSpPr>
+          <p:cNvPr id="27" name="直接连接符 26">
+            <a:extLst>
+              <a:ext uri="{FF2B5EF4-FFF2-40B4-BE49-F238E27FC236}">
+                <a16:creationId xmlns:a16="http://schemas.microsoft.com/office/drawing/2014/main" id="{E0982598-2211-4659-A0CC-CFB46092CFFD}"/>
+              </a:ext>
+            </a:extLst>
+          </p:cNvPr>
+          <p:cNvCxnSpPr>
+            <a:cxnSpLocks/>
+          </p:cNvCxnSpPr>
+          <p:nvPr/>
+        </p:nvCxnSpPr>
+        <p:spPr>
+          <a:xfrm flipH="1" flipV="1">
+            <a:off x="2787884" y="3985726"/>
+            <a:ext cx="1667651" cy="71133"/>
+          </a:xfrm>
+          <a:prstGeom prst="line">
+            <a:avLst/>
+          </a:prstGeom>
+          <a:ln>
+            <a:tailEnd type="none" w="lg" len="lg"/>
+          </a:ln>
+        </p:spPr>
+        <p:style>
+          <a:lnRef idx="1">
+            <a:schemeClr val="dk1"/>
+          </a:lnRef>
+          <a:fillRef idx="0">
+            <a:schemeClr val="dk1"/>
+          </a:fillRef>
+          <a:effectRef idx="0">
+            <a:schemeClr val="dk1"/>
+          </a:effectRef>
+          <a:fontRef idx="minor">
+            <a:schemeClr val="tx1"/>
+          </a:fontRef>
+        </p:style>
+      </p:cxnSp>
+      <p:cxnSp>
+        <p:nvCxnSpPr>
+          <p:cNvPr id="28" name="直接连接符 27">
+            <a:extLst>
+              <a:ext uri="{FF2B5EF4-FFF2-40B4-BE49-F238E27FC236}">
+                <a16:creationId xmlns:a16="http://schemas.microsoft.com/office/drawing/2014/main" id="{929A5122-C58A-4BAC-9831-2518AF2DBF8F}"/>
+              </a:ext>
+            </a:extLst>
+          </p:cNvPr>
+          <p:cNvCxnSpPr>
+            <a:cxnSpLocks/>
+            <a:endCxn id="4" idx="4"/>
+          </p:cNvCxnSpPr>
+          <p:nvPr/>
+        </p:nvCxnSpPr>
+        <p:spPr>
+          <a:xfrm flipH="1" flipV="1">
+            <a:off x="2275027" y="2465841"/>
+            <a:ext cx="94774" cy="1154998"/>
+          </a:xfrm>
+          <a:prstGeom prst="line">
+            <a:avLst/>
+          </a:prstGeom>
+          <a:ln>
+            <a:tailEnd type="none" w="lg" len="lg"/>
+          </a:ln>
+        </p:spPr>
+        <p:style>
+          <a:lnRef idx="1">
+            <a:schemeClr val="dk1"/>
+          </a:lnRef>
+          <a:fillRef idx="0">
+            <a:schemeClr val="dk1"/>
+          </a:fillRef>
+          <a:effectRef idx="0">
+            <a:schemeClr val="dk1"/>
+          </a:effectRef>
+          <a:fontRef idx="minor">
+            <a:schemeClr val="tx1"/>
+          </a:fontRef>
+        </p:style>
+      </p:cxnSp>
+      <p:cxnSp>
+        <p:nvCxnSpPr>
+          <p:cNvPr id="29" name="直接连接符 28">
+            <a:extLst>
+              <a:ext uri="{FF2B5EF4-FFF2-40B4-BE49-F238E27FC236}">
+                <a16:creationId xmlns:a16="http://schemas.microsoft.com/office/drawing/2014/main" id="{2F22AE0B-88F4-4399-BA2C-ADEB99AFCB94}"/>
+              </a:ext>
+            </a:extLst>
+          </p:cNvPr>
+          <p:cNvCxnSpPr>
+            <a:cxnSpLocks/>
+          </p:cNvCxnSpPr>
+          <p:nvPr/>
+        </p:nvCxnSpPr>
+        <p:spPr>
+          <a:xfrm flipH="1" flipV="1">
+            <a:off x="2644121" y="2186200"/>
+            <a:ext cx="1837196" cy="106899"/>
+          </a:xfrm>
+          <a:prstGeom prst="line">
+            <a:avLst/>
+          </a:prstGeom>
+          <a:ln>
+            <a:tailEnd type="none" w="lg" len="lg"/>
+          </a:ln>
+        </p:spPr>
+        <p:style>
+          <a:lnRef idx="1">
+            <a:schemeClr val="dk1"/>
+          </a:lnRef>
+          <a:fillRef idx="0">
+            <a:schemeClr val="dk1"/>
+          </a:fillRef>
+          <a:effectRef idx="0">
+            <a:schemeClr val="dk1"/>
+          </a:effectRef>
+          <a:fontRef idx="minor">
+            <a:schemeClr val="tx1"/>
+          </a:fontRef>
+        </p:style>
+      </p:cxnSp>
+      <p:cxnSp>
+        <p:nvCxnSpPr>
+          <p:cNvPr id="30" name="直接连接符 29">
+            <a:extLst>
+              <a:ext uri="{FF2B5EF4-FFF2-40B4-BE49-F238E27FC236}">
+                <a16:creationId xmlns:a16="http://schemas.microsoft.com/office/drawing/2014/main" id="{87A2A365-CFEC-4EF8-A8B6-896AA3DD3656}"/>
+              </a:ext>
+            </a:extLst>
+          </p:cNvPr>
+          <p:cNvCxnSpPr>
+            <a:cxnSpLocks/>
+          </p:cNvCxnSpPr>
+          <p:nvPr/>
+        </p:nvCxnSpPr>
+        <p:spPr>
+          <a:xfrm flipV="1">
+            <a:off x="4837507" y="2597955"/>
+            <a:ext cx="0" cy="1113453"/>
+          </a:xfrm>
+          <a:prstGeom prst="line">
+            <a:avLst/>
+          </a:prstGeom>
+          <a:ln>
+            <a:tailEnd type="none" w="lg" len="lg"/>
+          </a:ln>
+        </p:spPr>
+        <p:style>
+          <a:lnRef idx="1">
+            <a:schemeClr val="dk1"/>
+          </a:lnRef>
+          <a:fillRef idx="0">
+            <a:schemeClr val="dk1"/>
+          </a:fillRef>
+          <a:effectRef idx="0">
+            <a:schemeClr val="dk1"/>
+          </a:effectRef>
+          <a:fontRef idx="minor">
+            <a:schemeClr val="tx1"/>
+          </a:fontRef>
+        </p:style>
+      </p:cxnSp>
+      <p:cxnSp>
+        <p:nvCxnSpPr>
+          <p:cNvPr id="31" name="直接连接符 30">
+            <a:extLst>
+              <a:ext uri="{FF2B5EF4-FFF2-40B4-BE49-F238E27FC236}">
+                <a16:creationId xmlns:a16="http://schemas.microsoft.com/office/drawing/2014/main" id="{4042F740-FF3D-4D8E-9D13-C6C64131E076}"/>
+              </a:ext>
+            </a:extLst>
+          </p:cNvPr>
+          <p:cNvCxnSpPr>
+            <a:cxnSpLocks/>
+          </p:cNvCxnSpPr>
+          <p:nvPr/>
+        </p:nvCxnSpPr>
+        <p:spPr>
+          <a:xfrm flipH="1">
+            <a:off x="5268036" y="2186200"/>
+            <a:ext cx="810073" cy="30699"/>
+          </a:xfrm>
+          <a:prstGeom prst="line">
+            <a:avLst/>
+          </a:prstGeom>
+          <a:ln w="25400">
+            <a:solidFill>
+              <a:srgbClr val="FF0000"/>
+            </a:solidFill>
+            <a:tailEnd type="none" w="lg" len="lg"/>
+          </a:ln>
+        </p:spPr>
+        <p:style>
+          <a:lnRef idx="1">
+            <a:schemeClr val="dk1"/>
+          </a:lnRef>
+          <a:fillRef idx="0">
+            <a:schemeClr val="dk1"/>
+          </a:fillRef>
+          <a:effectRef idx="0">
+            <a:schemeClr val="dk1"/>
+          </a:effectRef>
+          <a:fontRef idx="minor">
+            <a:schemeClr val="tx1"/>
+          </a:fontRef>
+        </p:style>
+      </p:cxnSp>
+      <p:cxnSp>
+        <p:nvCxnSpPr>
+          <p:cNvPr id="32" name="直接连接符 31">
+            <a:extLst>
+              <a:ext uri="{FF2B5EF4-FFF2-40B4-BE49-F238E27FC236}">
+                <a16:creationId xmlns:a16="http://schemas.microsoft.com/office/drawing/2014/main" id="{B53380C7-B3C3-4FC1-9FD9-B3E35FF3803A}"/>
+              </a:ext>
+            </a:extLst>
+          </p:cNvPr>
+          <p:cNvCxnSpPr>
+            <a:cxnSpLocks/>
+          </p:cNvCxnSpPr>
+          <p:nvPr/>
+        </p:nvCxnSpPr>
+        <p:spPr>
+          <a:xfrm flipH="1" flipV="1">
+            <a:off x="6885296" y="2155502"/>
+            <a:ext cx="1341409" cy="61397"/>
+          </a:xfrm>
+          <a:prstGeom prst="line">
+            <a:avLst/>
+          </a:prstGeom>
+          <a:ln w="25400">
+            <a:solidFill>
+              <a:srgbClr val="FF0000"/>
+            </a:solidFill>
+            <a:tailEnd type="none" w="lg" len="lg"/>
+          </a:ln>
+        </p:spPr>
+        <p:style>
+          <a:lnRef idx="1">
+            <a:schemeClr val="dk1"/>
+          </a:lnRef>
+          <a:fillRef idx="0">
+            <a:schemeClr val="dk1"/>
+          </a:fillRef>
+          <a:effectRef idx="0">
+            <a:schemeClr val="dk1"/>
+          </a:effectRef>
+          <a:fontRef idx="minor">
+            <a:schemeClr val="tx1"/>
+          </a:fontRef>
+        </p:style>
+      </p:cxnSp>
+      <p:cxnSp>
+        <p:nvCxnSpPr>
+          <p:cNvPr id="33" name="直接连接符 32">
+            <a:extLst>
+              <a:ext uri="{FF2B5EF4-FFF2-40B4-BE49-F238E27FC236}">
+                <a16:creationId xmlns:a16="http://schemas.microsoft.com/office/drawing/2014/main" id="{87C8613C-FF84-4981-B58B-04C93485906B}"/>
+              </a:ext>
+            </a:extLst>
+          </p:cNvPr>
+          <p:cNvCxnSpPr>
+            <a:cxnSpLocks/>
+          </p:cNvCxnSpPr>
+          <p:nvPr/>
+        </p:nvCxnSpPr>
+        <p:spPr>
+          <a:xfrm flipV="1">
+            <a:off x="9103057" y="3254206"/>
+            <a:ext cx="844396" cy="528333"/>
+          </a:xfrm>
+          <a:prstGeom prst="line">
+            <a:avLst/>
+          </a:prstGeom>
+          <a:ln>
+            <a:tailEnd type="none" w="lg" len="lg"/>
+          </a:ln>
+        </p:spPr>
+        <p:style>
+          <a:lnRef idx="1">
+            <a:schemeClr val="dk1"/>
+          </a:lnRef>
+          <a:fillRef idx="0">
+            <a:schemeClr val="dk1"/>
+          </a:fillRef>
+          <a:effectRef idx="0">
+            <a:schemeClr val="dk1"/>
+          </a:effectRef>
+          <a:fontRef idx="minor">
+            <a:schemeClr val="tx1"/>
+          </a:fontRef>
+        </p:style>
+      </p:cxnSp>
+      <p:cxnSp>
+        <p:nvCxnSpPr>
+          <p:cNvPr id="34" name="直接连接符 33">
+            <a:extLst>
+              <a:ext uri="{FF2B5EF4-FFF2-40B4-BE49-F238E27FC236}">
+                <a16:creationId xmlns:a16="http://schemas.microsoft.com/office/drawing/2014/main" id="{4C6969BD-16DC-4286-8088-AF9914F84FD8}"/>
+              </a:ext>
+            </a:extLst>
+          </p:cNvPr>
+          <p:cNvCxnSpPr>
+            <a:cxnSpLocks/>
+          </p:cNvCxnSpPr>
+          <p:nvPr/>
+        </p:nvCxnSpPr>
+        <p:spPr>
+          <a:xfrm flipH="1" flipV="1">
+            <a:off x="9034818" y="2252502"/>
+            <a:ext cx="960379" cy="528333"/>
+          </a:xfrm>
+          <a:prstGeom prst="line">
+            <a:avLst/>
+          </a:prstGeom>
+          <a:ln>
+            <a:tailEnd type="none" w="lg" len="lg"/>
+          </a:ln>
+        </p:spPr>
+        <p:style>
+          <a:lnRef idx="1">
+            <a:schemeClr val="dk1"/>
+          </a:lnRef>
+          <a:fillRef idx="0">
+            <a:schemeClr val="dk1"/>
+          </a:fillRef>
+          <a:effectRef idx="0">
+            <a:schemeClr val="dk1"/>
+          </a:effectRef>
+          <a:fontRef idx="minor">
+            <a:schemeClr val="tx1"/>
+          </a:fontRef>
+        </p:style>
+      </p:cxnSp>
+      <p:cxnSp>
+        <p:nvCxnSpPr>
+          <p:cNvPr id="35" name="直接连接符 34">
+            <a:extLst>
+              <a:ext uri="{FF2B5EF4-FFF2-40B4-BE49-F238E27FC236}">
+                <a16:creationId xmlns:a16="http://schemas.microsoft.com/office/drawing/2014/main" id="{88573387-A871-478D-BB60-74F8DC906FEA}"/>
+              </a:ext>
+            </a:extLst>
+          </p:cNvPr>
+          <p:cNvCxnSpPr>
+            <a:cxnSpLocks/>
+          </p:cNvCxnSpPr>
+          <p:nvPr/>
+        </p:nvCxnSpPr>
+        <p:spPr>
+          <a:xfrm flipH="1" flipV="1">
+            <a:off x="8683905" y="2597955"/>
+            <a:ext cx="81723" cy="961166"/>
+          </a:xfrm>
+          <a:prstGeom prst="line">
+            <a:avLst/>
+          </a:prstGeom>
+          <a:ln>
+            <a:tailEnd type="none" w="lg" len="lg"/>
+          </a:ln>
+        </p:spPr>
+        <p:style>
+          <a:lnRef idx="1">
+            <a:schemeClr val="dk1"/>
+          </a:lnRef>
+          <a:fillRef idx="0">
+            <a:schemeClr val="dk1"/>
+          </a:fillRef>
+          <a:effectRef idx="0">
+            <a:schemeClr val="dk1"/>
+          </a:effectRef>
+          <a:fontRef idx="minor">
+            <a:schemeClr val="tx1"/>
+          </a:fontRef>
+        </p:style>
+      </p:cxnSp>
+    </p:spTree>
+    <p:extLst>
+      <p:ext uri="{BB962C8B-B14F-4D97-AF65-F5344CB8AC3E}">
+        <p14:creationId xmlns:p14="http://schemas.microsoft.com/office/powerpoint/2010/main" val="3376964746"/>
+      </p:ext>
+    </p:extLst>
+  </p:cSld>
+  <p:clrMapOvr>
+    <a:masterClrMapping/>
+  </p:clrMapOvr>
+</p:sld>
+</file>
+
 <file path=ppt/slides/slide2.xml><?xml version="1.0" encoding="utf-8"?>
 <p:sld xmlns:a="http://schemas.openxmlformats.org/drawingml/2006/main" xmlns:r="http://schemas.openxmlformats.org/officeDocument/2006/relationships" xmlns:p="http://schemas.openxmlformats.org/presentationml/2006/main">
   <p:cSld>

</xml_diff>

<commit_message>
220810C: Tarjan cut vertex done
</commit_message>
<xml_diff>
--- a/DSA_python/figure/python_DSA_fig.pptx
+++ b/DSA_python/figure/python_DSA_fig.pptx
@@ -16,6 +16,7 @@
     <p:sldId id="265" r:id="rId10"/>
     <p:sldId id="266" r:id="rId11"/>
     <p:sldId id="267" r:id="rId12"/>
+    <p:sldId id="268" r:id="rId13"/>
   </p:sldIdLst>
   <p:sldSz cx="12192000" cy="6858000"/>
   <p:notesSz cx="6858000" cy="9144000"/>
@@ -138,7 +139,11 @@
         <p14:section name="Cut Vertices" id="{63F99788-8463-40B9-81F2-A7048953D839}">
           <p14:sldIdLst>
             <p14:sldId id="267"/>
+            <p14:sldId id="268"/>
           </p14:sldIdLst>
+        </p14:section>
+        <p14:section name="无标题节" id="{0048D900-C22F-4983-9A5D-0288D901CD72}">
+          <p14:sldIdLst/>
         </p14:section>
       </p14:sectionLst>
     </p:ext>
@@ -296,7 +301,7 @@
           <a:p>
             <a:fld id="{87917046-8915-469F-BFA9-BCDFC2647EC4}" type="datetimeFigureOut">
               <a:rPr lang="zh-CN" altLang="en-US" smtClean="0"/>
-              <a:t>2022/8/8</a:t>
+              <a:t>2022/8/10</a:t>
             </a:fld>
             <a:endParaRPr lang="zh-CN" altLang="en-US"/>
           </a:p>
@@ -494,7 +499,7 @@
           <a:p>
             <a:fld id="{87917046-8915-469F-BFA9-BCDFC2647EC4}" type="datetimeFigureOut">
               <a:rPr lang="zh-CN" altLang="en-US" smtClean="0"/>
-              <a:t>2022/8/8</a:t>
+              <a:t>2022/8/10</a:t>
             </a:fld>
             <a:endParaRPr lang="zh-CN" altLang="en-US"/>
           </a:p>
@@ -702,7 +707,7 @@
           <a:p>
             <a:fld id="{87917046-8915-469F-BFA9-BCDFC2647EC4}" type="datetimeFigureOut">
               <a:rPr lang="zh-CN" altLang="en-US" smtClean="0"/>
-              <a:t>2022/8/8</a:t>
+              <a:t>2022/8/10</a:t>
             </a:fld>
             <a:endParaRPr lang="zh-CN" altLang="en-US"/>
           </a:p>
@@ -900,7 +905,7 @@
           <a:p>
             <a:fld id="{87917046-8915-469F-BFA9-BCDFC2647EC4}" type="datetimeFigureOut">
               <a:rPr lang="zh-CN" altLang="en-US" smtClean="0"/>
-              <a:t>2022/8/8</a:t>
+              <a:t>2022/8/10</a:t>
             </a:fld>
             <a:endParaRPr lang="zh-CN" altLang="en-US"/>
           </a:p>
@@ -1175,7 +1180,7 @@
           <a:p>
             <a:fld id="{87917046-8915-469F-BFA9-BCDFC2647EC4}" type="datetimeFigureOut">
               <a:rPr lang="zh-CN" altLang="en-US" smtClean="0"/>
-              <a:t>2022/8/8</a:t>
+              <a:t>2022/8/10</a:t>
             </a:fld>
             <a:endParaRPr lang="zh-CN" altLang="en-US"/>
           </a:p>
@@ -1440,7 +1445,7 @@
           <a:p>
             <a:fld id="{87917046-8915-469F-BFA9-BCDFC2647EC4}" type="datetimeFigureOut">
               <a:rPr lang="zh-CN" altLang="en-US" smtClean="0"/>
-              <a:t>2022/8/8</a:t>
+              <a:t>2022/8/10</a:t>
             </a:fld>
             <a:endParaRPr lang="zh-CN" altLang="en-US"/>
           </a:p>
@@ -1852,7 +1857,7 @@
           <a:p>
             <a:fld id="{87917046-8915-469F-BFA9-BCDFC2647EC4}" type="datetimeFigureOut">
               <a:rPr lang="zh-CN" altLang="en-US" smtClean="0"/>
-              <a:t>2022/8/8</a:t>
+              <a:t>2022/8/10</a:t>
             </a:fld>
             <a:endParaRPr lang="zh-CN" altLang="en-US"/>
           </a:p>
@@ -1993,7 +1998,7 @@
           <a:p>
             <a:fld id="{87917046-8915-469F-BFA9-BCDFC2647EC4}" type="datetimeFigureOut">
               <a:rPr lang="zh-CN" altLang="en-US" smtClean="0"/>
-              <a:t>2022/8/8</a:t>
+              <a:t>2022/8/10</a:t>
             </a:fld>
             <a:endParaRPr lang="zh-CN" altLang="en-US"/>
           </a:p>
@@ -2106,7 +2111,7 @@
           <a:p>
             <a:fld id="{87917046-8915-469F-BFA9-BCDFC2647EC4}" type="datetimeFigureOut">
               <a:rPr lang="zh-CN" altLang="en-US" smtClean="0"/>
-              <a:t>2022/8/8</a:t>
+              <a:t>2022/8/10</a:t>
             </a:fld>
             <a:endParaRPr lang="zh-CN" altLang="en-US"/>
           </a:p>
@@ -2417,7 +2422,7 @@
           <a:p>
             <a:fld id="{87917046-8915-469F-BFA9-BCDFC2647EC4}" type="datetimeFigureOut">
               <a:rPr lang="zh-CN" altLang="en-US" smtClean="0"/>
-              <a:t>2022/8/8</a:t>
+              <a:t>2022/8/10</a:t>
             </a:fld>
             <a:endParaRPr lang="zh-CN" altLang="en-US"/>
           </a:p>
@@ -2705,7 +2710,7 @@
           <a:p>
             <a:fld id="{87917046-8915-469F-BFA9-BCDFC2647EC4}" type="datetimeFigureOut">
               <a:rPr lang="zh-CN" altLang="en-US" smtClean="0"/>
-              <a:t>2022/8/8</a:t>
+              <a:t>2022/8/10</a:t>
             </a:fld>
             <a:endParaRPr lang="zh-CN" altLang="en-US"/>
           </a:p>
@@ -2946,7 +2951,7 @@
           <a:p>
             <a:fld id="{87917046-8915-469F-BFA9-BCDFC2647EC4}" type="datetimeFigureOut">
               <a:rPr lang="zh-CN" altLang="en-US" smtClean="0"/>
-              <a:t>2022/8/8</a:t>
+              <a:t>2022/8/10</a:t>
             </a:fld>
             <a:endParaRPr lang="zh-CN" altLang="en-US"/>
           </a:p>
@@ -7563,6 +7568,1619 @@
 </p:sld>
 </file>
 
+<file path=ppt/slides/slide12.xml><?xml version="1.0" encoding="utf-8"?>
+<p:sld xmlns:a="http://schemas.openxmlformats.org/drawingml/2006/main" xmlns:r="http://schemas.openxmlformats.org/officeDocument/2006/relationships" xmlns:p="http://schemas.openxmlformats.org/presentationml/2006/main">
+  <p:cSld>
+    <p:spTree>
+      <p:nvGrpSpPr>
+        <p:cNvPr id="1" name=""/>
+        <p:cNvGrpSpPr/>
+        <p:nvPr/>
+      </p:nvGrpSpPr>
+      <p:grpSpPr>
+        <a:xfrm>
+          <a:off x="0" y="0"/>
+          <a:ext cx="0" cy="0"/>
+          <a:chOff x="0" y="0"/>
+          <a:chExt cx="0" cy="0"/>
+        </a:xfrm>
+      </p:grpSpPr>
+      <p:sp>
+        <p:nvSpPr>
+          <p:cNvPr id="4" name="椭圆 3">
+            <a:extLst>
+              <a:ext uri="{FF2B5EF4-FFF2-40B4-BE49-F238E27FC236}">
+                <a16:creationId xmlns:a16="http://schemas.microsoft.com/office/drawing/2014/main" id="{4ADCD50D-2B5B-69A1-643B-764FB443C6BE}"/>
+              </a:ext>
+            </a:extLst>
+          </p:cNvPr>
+          <p:cNvSpPr/>
+          <p:nvPr/>
+        </p:nvSpPr>
+        <p:spPr>
+          <a:xfrm>
+            <a:off x="1990196" y="897697"/>
+            <a:ext cx="548640" cy="548640"/>
+          </a:xfrm>
+          <a:prstGeom prst="ellipse">
+            <a:avLst/>
+          </a:prstGeom>
+          <a:noFill/>
+          <a:ln>
+            <a:solidFill>
+              <a:schemeClr val="tx1"/>
+            </a:solidFill>
+          </a:ln>
+        </p:spPr>
+        <p:style>
+          <a:lnRef idx="2">
+            <a:schemeClr val="accent1">
+              <a:shade val="50000"/>
+            </a:schemeClr>
+          </a:lnRef>
+          <a:fillRef idx="1">
+            <a:schemeClr val="accent1"/>
+          </a:fillRef>
+          <a:effectRef idx="0">
+            <a:schemeClr val="accent1"/>
+          </a:effectRef>
+          <a:fontRef idx="minor">
+            <a:schemeClr val="lt1"/>
+          </a:fontRef>
+        </p:style>
+        <p:txBody>
+          <a:bodyPr rtlCol="0" anchor="ctr"/>
+          <a:lstStyle/>
+          <a:p>
+            <a:pPr algn="ctr"/>
+            <a:r>
+              <a:rPr lang="en-US" altLang="zh-CN" dirty="0">
+                <a:solidFill>
+                  <a:schemeClr val="tx1"/>
+                </a:solidFill>
+                <a:latin typeface="Times New Roman" panose="02020603050405020304" pitchFamily="18" charset="0"/>
+                <a:cs typeface="Times New Roman" panose="02020603050405020304" pitchFamily="18" charset="0"/>
+              </a:rPr>
+              <a:t>A</a:t>
+            </a:r>
+            <a:endParaRPr lang="zh-CN" altLang="en-US" dirty="0">
+              <a:solidFill>
+                <a:schemeClr val="tx1"/>
+              </a:solidFill>
+              <a:latin typeface="Times New Roman" panose="02020603050405020304" pitchFamily="18" charset="0"/>
+              <a:cs typeface="Times New Roman" panose="02020603050405020304" pitchFamily="18" charset="0"/>
+            </a:endParaRPr>
+          </a:p>
+        </p:txBody>
+      </p:sp>
+      <p:cxnSp>
+        <p:nvCxnSpPr>
+          <p:cNvPr id="5" name="直接连接符 4">
+            <a:extLst>
+              <a:ext uri="{FF2B5EF4-FFF2-40B4-BE49-F238E27FC236}">
+                <a16:creationId xmlns:a16="http://schemas.microsoft.com/office/drawing/2014/main" id="{9D778D71-FC8E-A9F8-965E-1F5BC8E13DE9}"/>
+              </a:ext>
+            </a:extLst>
+          </p:cNvPr>
+          <p:cNvCxnSpPr>
+            <a:cxnSpLocks/>
+          </p:cNvCxnSpPr>
+          <p:nvPr/>
+        </p:nvCxnSpPr>
+        <p:spPr>
+          <a:xfrm flipV="1">
+            <a:off x="1608083" y="1446337"/>
+            <a:ext cx="550098" cy="708284"/>
+          </a:xfrm>
+          <a:prstGeom prst="line">
+            <a:avLst/>
+          </a:prstGeom>
+          <a:ln>
+            <a:tailEnd type="none" w="lg" len="lg"/>
+          </a:ln>
+        </p:spPr>
+        <p:style>
+          <a:lnRef idx="1">
+            <a:schemeClr val="dk1"/>
+          </a:lnRef>
+          <a:fillRef idx="0">
+            <a:schemeClr val="dk1"/>
+          </a:fillRef>
+          <a:effectRef idx="0">
+            <a:schemeClr val="dk1"/>
+          </a:effectRef>
+          <a:fontRef idx="minor">
+            <a:schemeClr val="tx1"/>
+          </a:fontRef>
+        </p:style>
+      </p:cxnSp>
+      <p:sp>
+        <p:nvSpPr>
+          <p:cNvPr id="9" name="椭圆 8">
+            <a:extLst>
+              <a:ext uri="{FF2B5EF4-FFF2-40B4-BE49-F238E27FC236}">
+                <a16:creationId xmlns:a16="http://schemas.microsoft.com/office/drawing/2014/main" id="{AA7135D9-BFEF-3D10-3EDB-4CE397AEA51B}"/>
+              </a:ext>
+            </a:extLst>
+          </p:cNvPr>
+          <p:cNvSpPr/>
+          <p:nvPr/>
+        </p:nvSpPr>
+        <p:spPr>
+          <a:xfrm>
+            <a:off x="1868276" y="3588459"/>
+            <a:ext cx="548640" cy="548640"/>
+          </a:xfrm>
+          <a:prstGeom prst="ellipse">
+            <a:avLst/>
+          </a:prstGeom>
+          <a:noFill/>
+          <a:ln>
+            <a:solidFill>
+              <a:schemeClr val="tx1"/>
+            </a:solidFill>
+          </a:ln>
+        </p:spPr>
+        <p:style>
+          <a:lnRef idx="2">
+            <a:schemeClr val="accent1">
+              <a:shade val="50000"/>
+            </a:schemeClr>
+          </a:lnRef>
+          <a:fillRef idx="1">
+            <a:schemeClr val="accent1"/>
+          </a:fillRef>
+          <a:effectRef idx="0">
+            <a:schemeClr val="accent1"/>
+          </a:effectRef>
+          <a:fontRef idx="minor">
+            <a:schemeClr val="lt1"/>
+          </a:fontRef>
+        </p:style>
+        <p:txBody>
+          <a:bodyPr rtlCol="0" anchor="ctr"/>
+          <a:lstStyle/>
+          <a:p>
+            <a:pPr algn="ctr"/>
+            <a:r>
+              <a:rPr lang="en-US" altLang="zh-CN" dirty="0">
+                <a:solidFill>
+                  <a:schemeClr val="tx1"/>
+                </a:solidFill>
+                <a:latin typeface="Times New Roman" panose="02020603050405020304" pitchFamily="18" charset="0"/>
+                <a:cs typeface="Times New Roman" panose="02020603050405020304" pitchFamily="18" charset="0"/>
+              </a:rPr>
+              <a:t>E</a:t>
+            </a:r>
+            <a:endParaRPr lang="zh-CN" altLang="en-US" dirty="0">
+              <a:solidFill>
+                <a:schemeClr val="tx1"/>
+              </a:solidFill>
+              <a:latin typeface="Times New Roman" panose="02020603050405020304" pitchFamily="18" charset="0"/>
+              <a:cs typeface="Times New Roman" panose="02020603050405020304" pitchFamily="18" charset="0"/>
+            </a:endParaRPr>
+          </a:p>
+        </p:txBody>
+      </p:sp>
+      <p:sp>
+        <p:nvSpPr>
+          <p:cNvPr id="10" name="椭圆 9">
+            <a:extLst>
+              <a:ext uri="{FF2B5EF4-FFF2-40B4-BE49-F238E27FC236}">
+                <a16:creationId xmlns:a16="http://schemas.microsoft.com/office/drawing/2014/main" id="{2F00DF7D-250A-7BD5-A20A-D98473191BD8}"/>
+              </a:ext>
+            </a:extLst>
+          </p:cNvPr>
+          <p:cNvSpPr/>
+          <p:nvPr/>
+        </p:nvSpPr>
+        <p:spPr>
+          <a:xfrm>
+            <a:off x="213948" y="3597805"/>
+            <a:ext cx="548640" cy="548640"/>
+          </a:xfrm>
+          <a:prstGeom prst="ellipse">
+            <a:avLst/>
+          </a:prstGeom>
+          <a:noFill/>
+          <a:ln>
+            <a:solidFill>
+              <a:schemeClr val="tx1"/>
+            </a:solidFill>
+          </a:ln>
+        </p:spPr>
+        <p:style>
+          <a:lnRef idx="2">
+            <a:schemeClr val="accent1">
+              <a:shade val="50000"/>
+            </a:schemeClr>
+          </a:lnRef>
+          <a:fillRef idx="1">
+            <a:schemeClr val="accent1"/>
+          </a:fillRef>
+          <a:effectRef idx="0">
+            <a:schemeClr val="accent1"/>
+          </a:effectRef>
+          <a:fontRef idx="minor">
+            <a:schemeClr val="lt1"/>
+          </a:fontRef>
+        </p:style>
+        <p:txBody>
+          <a:bodyPr rtlCol="0" anchor="ctr"/>
+          <a:lstStyle/>
+          <a:p>
+            <a:pPr algn="ctr"/>
+            <a:r>
+              <a:rPr lang="en-US" altLang="zh-CN" dirty="0">
+                <a:solidFill>
+                  <a:schemeClr val="tx1"/>
+                </a:solidFill>
+                <a:latin typeface="Times New Roman" panose="02020603050405020304" pitchFamily="18" charset="0"/>
+                <a:cs typeface="Times New Roman" panose="02020603050405020304" pitchFamily="18" charset="0"/>
+              </a:rPr>
+              <a:t>D</a:t>
+            </a:r>
+            <a:endParaRPr lang="zh-CN" altLang="en-US" dirty="0">
+              <a:solidFill>
+                <a:schemeClr val="tx1"/>
+              </a:solidFill>
+              <a:latin typeface="Times New Roman" panose="02020603050405020304" pitchFamily="18" charset="0"/>
+              <a:cs typeface="Times New Roman" panose="02020603050405020304" pitchFamily="18" charset="0"/>
+            </a:endParaRPr>
+          </a:p>
+        </p:txBody>
+      </p:sp>
+      <p:sp>
+        <p:nvSpPr>
+          <p:cNvPr id="11" name="椭圆 10">
+            <a:extLst>
+              <a:ext uri="{FF2B5EF4-FFF2-40B4-BE49-F238E27FC236}">
+                <a16:creationId xmlns:a16="http://schemas.microsoft.com/office/drawing/2014/main" id="{F12F8286-60E4-77B6-40EE-82A877C3027E}"/>
+              </a:ext>
+            </a:extLst>
+          </p:cNvPr>
+          <p:cNvSpPr/>
+          <p:nvPr/>
+        </p:nvSpPr>
+        <p:spPr>
+          <a:xfrm>
+            <a:off x="2691236" y="2208337"/>
+            <a:ext cx="548640" cy="548640"/>
+          </a:xfrm>
+          <a:prstGeom prst="ellipse">
+            <a:avLst/>
+          </a:prstGeom>
+          <a:noFill/>
+          <a:ln>
+            <a:solidFill>
+              <a:schemeClr val="tx1"/>
+            </a:solidFill>
+          </a:ln>
+        </p:spPr>
+        <p:style>
+          <a:lnRef idx="2">
+            <a:schemeClr val="accent1">
+              <a:shade val="50000"/>
+            </a:schemeClr>
+          </a:lnRef>
+          <a:fillRef idx="1">
+            <a:schemeClr val="accent1"/>
+          </a:fillRef>
+          <a:effectRef idx="0">
+            <a:schemeClr val="accent1"/>
+          </a:effectRef>
+          <a:fontRef idx="minor">
+            <a:schemeClr val="lt1"/>
+          </a:fontRef>
+        </p:style>
+        <p:txBody>
+          <a:bodyPr rtlCol="0" anchor="ctr"/>
+          <a:lstStyle/>
+          <a:p>
+            <a:pPr algn="ctr"/>
+            <a:r>
+              <a:rPr lang="en-US" altLang="zh-CN" dirty="0">
+                <a:solidFill>
+                  <a:schemeClr val="tx1"/>
+                </a:solidFill>
+                <a:latin typeface="Times New Roman" panose="02020603050405020304" pitchFamily="18" charset="0"/>
+                <a:cs typeface="Times New Roman" panose="02020603050405020304" pitchFamily="18" charset="0"/>
+              </a:rPr>
+              <a:t>C</a:t>
+            </a:r>
+            <a:endParaRPr lang="zh-CN" altLang="en-US" dirty="0">
+              <a:solidFill>
+                <a:schemeClr val="tx1"/>
+              </a:solidFill>
+              <a:latin typeface="Times New Roman" panose="02020603050405020304" pitchFamily="18" charset="0"/>
+              <a:cs typeface="Times New Roman" panose="02020603050405020304" pitchFamily="18" charset="0"/>
+            </a:endParaRPr>
+          </a:p>
+        </p:txBody>
+      </p:sp>
+      <p:sp>
+        <p:nvSpPr>
+          <p:cNvPr id="12" name="椭圆 11">
+            <a:extLst>
+              <a:ext uri="{FF2B5EF4-FFF2-40B4-BE49-F238E27FC236}">
+                <a16:creationId xmlns:a16="http://schemas.microsoft.com/office/drawing/2014/main" id="{6FF166B5-10BA-E82A-D7B9-94BDDAE3CD17}"/>
+              </a:ext>
+            </a:extLst>
+          </p:cNvPr>
+          <p:cNvSpPr/>
+          <p:nvPr/>
+        </p:nvSpPr>
+        <p:spPr>
+          <a:xfrm>
+            <a:off x="7559043" y="1631376"/>
+            <a:ext cx="548640" cy="548640"/>
+          </a:xfrm>
+          <a:prstGeom prst="ellipse">
+            <a:avLst/>
+          </a:prstGeom>
+          <a:noFill/>
+          <a:ln>
+            <a:solidFill>
+              <a:schemeClr val="tx1"/>
+            </a:solidFill>
+          </a:ln>
+        </p:spPr>
+        <p:style>
+          <a:lnRef idx="2">
+            <a:schemeClr val="accent1">
+              <a:shade val="50000"/>
+            </a:schemeClr>
+          </a:lnRef>
+          <a:fillRef idx="1">
+            <a:schemeClr val="accent1"/>
+          </a:fillRef>
+          <a:effectRef idx="0">
+            <a:schemeClr val="accent1"/>
+          </a:effectRef>
+          <a:fontRef idx="minor">
+            <a:schemeClr val="lt1"/>
+          </a:fontRef>
+        </p:style>
+        <p:txBody>
+          <a:bodyPr rtlCol="0" anchor="ctr"/>
+          <a:lstStyle/>
+          <a:p>
+            <a:pPr algn="ctr"/>
+            <a:r>
+              <a:rPr lang="en-US" altLang="zh-CN" dirty="0">
+                <a:solidFill>
+                  <a:schemeClr val="tx1"/>
+                </a:solidFill>
+                <a:latin typeface="Times New Roman" panose="02020603050405020304" pitchFamily="18" charset="0"/>
+                <a:cs typeface="Times New Roman" panose="02020603050405020304" pitchFamily="18" charset="0"/>
+              </a:rPr>
+              <a:t>A</a:t>
+            </a:r>
+            <a:endParaRPr lang="zh-CN" altLang="en-US" dirty="0">
+              <a:solidFill>
+                <a:schemeClr val="tx1"/>
+              </a:solidFill>
+              <a:latin typeface="Times New Roman" panose="02020603050405020304" pitchFamily="18" charset="0"/>
+              <a:cs typeface="Times New Roman" panose="02020603050405020304" pitchFamily="18" charset="0"/>
+            </a:endParaRPr>
+          </a:p>
+        </p:txBody>
+      </p:sp>
+      <p:sp>
+        <p:nvSpPr>
+          <p:cNvPr id="13" name="椭圆 12">
+            <a:extLst>
+              <a:ext uri="{FF2B5EF4-FFF2-40B4-BE49-F238E27FC236}">
+                <a16:creationId xmlns:a16="http://schemas.microsoft.com/office/drawing/2014/main" id="{4ECA75F4-B4C5-C94F-4293-DB3708D7DAC9}"/>
+              </a:ext>
+            </a:extLst>
+          </p:cNvPr>
+          <p:cNvSpPr/>
+          <p:nvPr/>
+        </p:nvSpPr>
+        <p:spPr>
+          <a:xfrm>
+            <a:off x="1210854" y="2154621"/>
+            <a:ext cx="548640" cy="548640"/>
+          </a:xfrm>
+          <a:prstGeom prst="ellipse">
+            <a:avLst/>
+          </a:prstGeom>
+          <a:noFill/>
+          <a:ln>
+            <a:solidFill>
+              <a:schemeClr val="tx1"/>
+            </a:solidFill>
+          </a:ln>
+        </p:spPr>
+        <p:style>
+          <a:lnRef idx="2">
+            <a:schemeClr val="accent1">
+              <a:shade val="50000"/>
+            </a:schemeClr>
+          </a:lnRef>
+          <a:fillRef idx="1">
+            <a:schemeClr val="accent1"/>
+          </a:fillRef>
+          <a:effectRef idx="0">
+            <a:schemeClr val="accent1"/>
+          </a:effectRef>
+          <a:fontRef idx="minor">
+            <a:schemeClr val="lt1"/>
+          </a:fontRef>
+        </p:style>
+        <p:txBody>
+          <a:bodyPr rtlCol="0" anchor="ctr"/>
+          <a:lstStyle/>
+          <a:p>
+            <a:pPr algn="ctr"/>
+            <a:r>
+              <a:rPr lang="en-US" altLang="zh-CN" dirty="0">
+                <a:solidFill>
+                  <a:schemeClr val="tx1"/>
+                </a:solidFill>
+                <a:latin typeface="Times New Roman" panose="02020603050405020304" pitchFamily="18" charset="0"/>
+                <a:cs typeface="Times New Roman" panose="02020603050405020304" pitchFamily="18" charset="0"/>
+              </a:rPr>
+              <a:t>B</a:t>
+            </a:r>
+            <a:endParaRPr lang="zh-CN" altLang="en-US" dirty="0">
+              <a:solidFill>
+                <a:schemeClr val="tx1"/>
+              </a:solidFill>
+              <a:latin typeface="Times New Roman" panose="02020603050405020304" pitchFamily="18" charset="0"/>
+              <a:cs typeface="Times New Roman" panose="02020603050405020304" pitchFamily="18" charset="0"/>
+            </a:endParaRPr>
+          </a:p>
+        </p:txBody>
+      </p:sp>
+      <p:sp>
+        <p:nvSpPr>
+          <p:cNvPr id="14" name="椭圆 13">
+            <a:extLst>
+              <a:ext uri="{FF2B5EF4-FFF2-40B4-BE49-F238E27FC236}">
+                <a16:creationId xmlns:a16="http://schemas.microsoft.com/office/drawing/2014/main" id="{C9EF4200-5175-1A4B-7E5A-481CBDBF6AF4}"/>
+              </a:ext>
+            </a:extLst>
+          </p:cNvPr>
+          <p:cNvSpPr/>
+          <p:nvPr/>
+        </p:nvSpPr>
+        <p:spPr>
+          <a:xfrm>
+            <a:off x="6014607" y="4104403"/>
+            <a:ext cx="548640" cy="548640"/>
+          </a:xfrm>
+          <a:prstGeom prst="ellipse">
+            <a:avLst/>
+          </a:prstGeom>
+          <a:noFill/>
+          <a:ln>
+            <a:solidFill>
+              <a:schemeClr val="tx1"/>
+            </a:solidFill>
+          </a:ln>
+        </p:spPr>
+        <p:style>
+          <a:lnRef idx="2">
+            <a:schemeClr val="accent1">
+              <a:shade val="50000"/>
+            </a:schemeClr>
+          </a:lnRef>
+          <a:fillRef idx="1">
+            <a:schemeClr val="accent1"/>
+          </a:fillRef>
+          <a:effectRef idx="0">
+            <a:schemeClr val="accent1"/>
+          </a:effectRef>
+          <a:fontRef idx="minor">
+            <a:schemeClr val="lt1"/>
+          </a:fontRef>
+        </p:style>
+        <p:txBody>
+          <a:bodyPr rtlCol="0" anchor="ctr"/>
+          <a:lstStyle/>
+          <a:p>
+            <a:pPr algn="ctr"/>
+            <a:r>
+              <a:rPr lang="en-US" altLang="zh-CN" dirty="0">
+                <a:solidFill>
+                  <a:schemeClr val="tx1"/>
+                </a:solidFill>
+                <a:latin typeface="Times New Roman" panose="02020603050405020304" pitchFamily="18" charset="0"/>
+                <a:cs typeface="Times New Roman" panose="02020603050405020304" pitchFamily="18" charset="0"/>
+              </a:rPr>
+              <a:t>C</a:t>
+            </a:r>
+            <a:endParaRPr lang="zh-CN" altLang="en-US" dirty="0">
+              <a:solidFill>
+                <a:schemeClr val="tx1"/>
+              </a:solidFill>
+              <a:latin typeface="Times New Roman" panose="02020603050405020304" pitchFamily="18" charset="0"/>
+              <a:cs typeface="Times New Roman" panose="02020603050405020304" pitchFamily="18" charset="0"/>
+            </a:endParaRPr>
+          </a:p>
+        </p:txBody>
+      </p:sp>
+      <p:sp>
+        <p:nvSpPr>
+          <p:cNvPr id="15" name="椭圆 14">
+            <a:extLst>
+              <a:ext uri="{FF2B5EF4-FFF2-40B4-BE49-F238E27FC236}">
+                <a16:creationId xmlns:a16="http://schemas.microsoft.com/office/drawing/2014/main" id="{B0309C89-D30E-462F-4CE6-6B401544FAA7}"/>
+              </a:ext>
+            </a:extLst>
+          </p:cNvPr>
+          <p:cNvSpPr/>
+          <p:nvPr/>
+        </p:nvSpPr>
+        <p:spPr>
+          <a:xfrm>
+            <a:off x="7156031" y="2923566"/>
+            <a:ext cx="548640" cy="548640"/>
+          </a:xfrm>
+          <a:prstGeom prst="ellipse">
+            <a:avLst/>
+          </a:prstGeom>
+          <a:noFill/>
+          <a:ln>
+            <a:solidFill>
+              <a:schemeClr val="tx1"/>
+            </a:solidFill>
+          </a:ln>
+        </p:spPr>
+        <p:style>
+          <a:lnRef idx="2">
+            <a:schemeClr val="accent1">
+              <a:shade val="50000"/>
+            </a:schemeClr>
+          </a:lnRef>
+          <a:fillRef idx="1">
+            <a:schemeClr val="accent1"/>
+          </a:fillRef>
+          <a:effectRef idx="0">
+            <a:schemeClr val="accent1"/>
+          </a:effectRef>
+          <a:fontRef idx="minor">
+            <a:schemeClr val="lt1"/>
+          </a:fontRef>
+        </p:style>
+        <p:txBody>
+          <a:bodyPr rtlCol="0" anchor="ctr"/>
+          <a:lstStyle/>
+          <a:p>
+            <a:pPr algn="ctr"/>
+            <a:r>
+              <a:rPr lang="en-US" altLang="zh-CN" dirty="0">
+                <a:solidFill>
+                  <a:schemeClr val="tx1"/>
+                </a:solidFill>
+                <a:latin typeface="Times New Roman" panose="02020603050405020304" pitchFamily="18" charset="0"/>
+                <a:cs typeface="Times New Roman" panose="02020603050405020304" pitchFamily="18" charset="0"/>
+              </a:rPr>
+              <a:t>B</a:t>
+            </a:r>
+            <a:endParaRPr lang="zh-CN" altLang="en-US" dirty="0">
+              <a:solidFill>
+                <a:schemeClr val="tx1"/>
+              </a:solidFill>
+              <a:latin typeface="Times New Roman" panose="02020603050405020304" pitchFamily="18" charset="0"/>
+              <a:cs typeface="Times New Roman" panose="02020603050405020304" pitchFamily="18" charset="0"/>
+            </a:endParaRPr>
+          </a:p>
+        </p:txBody>
+      </p:sp>
+      <p:sp>
+        <p:nvSpPr>
+          <p:cNvPr id="16" name="椭圆 15">
+            <a:extLst>
+              <a:ext uri="{FF2B5EF4-FFF2-40B4-BE49-F238E27FC236}">
+                <a16:creationId xmlns:a16="http://schemas.microsoft.com/office/drawing/2014/main" id="{2E3C623C-7D34-BF34-CDF1-693CF7325C73}"/>
+              </a:ext>
+            </a:extLst>
+          </p:cNvPr>
+          <p:cNvSpPr/>
+          <p:nvPr/>
+        </p:nvSpPr>
+        <p:spPr>
+          <a:xfrm>
+            <a:off x="7875989" y="3924676"/>
+            <a:ext cx="548640" cy="548640"/>
+          </a:xfrm>
+          <a:prstGeom prst="ellipse">
+            <a:avLst/>
+          </a:prstGeom>
+          <a:noFill/>
+          <a:ln>
+            <a:solidFill>
+              <a:schemeClr val="tx1"/>
+            </a:solidFill>
+          </a:ln>
+        </p:spPr>
+        <p:style>
+          <a:lnRef idx="2">
+            <a:schemeClr val="accent1">
+              <a:shade val="50000"/>
+            </a:schemeClr>
+          </a:lnRef>
+          <a:fillRef idx="1">
+            <a:schemeClr val="accent1"/>
+          </a:fillRef>
+          <a:effectRef idx="0">
+            <a:schemeClr val="accent1"/>
+          </a:effectRef>
+          <a:fontRef idx="minor">
+            <a:schemeClr val="lt1"/>
+          </a:fontRef>
+        </p:style>
+        <p:txBody>
+          <a:bodyPr rtlCol="0" anchor="ctr"/>
+          <a:lstStyle/>
+          <a:p>
+            <a:pPr algn="ctr"/>
+            <a:r>
+              <a:rPr lang="en-US" altLang="zh-CN" dirty="0">
+                <a:solidFill>
+                  <a:schemeClr val="tx1"/>
+                </a:solidFill>
+                <a:latin typeface="Times New Roman" panose="02020603050405020304" pitchFamily="18" charset="0"/>
+                <a:cs typeface="Times New Roman" panose="02020603050405020304" pitchFamily="18" charset="0"/>
+              </a:rPr>
+              <a:t>D</a:t>
+            </a:r>
+            <a:endParaRPr lang="zh-CN" altLang="en-US" dirty="0">
+              <a:solidFill>
+                <a:schemeClr val="tx1"/>
+              </a:solidFill>
+              <a:latin typeface="Times New Roman" panose="02020603050405020304" pitchFamily="18" charset="0"/>
+              <a:cs typeface="Times New Roman" panose="02020603050405020304" pitchFamily="18" charset="0"/>
+            </a:endParaRPr>
+          </a:p>
+        </p:txBody>
+      </p:sp>
+      <p:sp>
+        <p:nvSpPr>
+          <p:cNvPr id="17" name="椭圆 16">
+            <a:extLst>
+              <a:ext uri="{FF2B5EF4-FFF2-40B4-BE49-F238E27FC236}">
+                <a16:creationId xmlns:a16="http://schemas.microsoft.com/office/drawing/2014/main" id="{71EA74A5-51DF-B5E8-809F-AE21E4A6BD85}"/>
+              </a:ext>
+            </a:extLst>
+          </p:cNvPr>
+          <p:cNvSpPr/>
+          <p:nvPr/>
+        </p:nvSpPr>
+        <p:spPr>
+          <a:xfrm>
+            <a:off x="8553907" y="4791780"/>
+            <a:ext cx="548640" cy="548640"/>
+          </a:xfrm>
+          <a:prstGeom prst="ellipse">
+            <a:avLst/>
+          </a:prstGeom>
+          <a:noFill/>
+          <a:ln>
+            <a:solidFill>
+              <a:schemeClr val="tx1"/>
+            </a:solidFill>
+          </a:ln>
+        </p:spPr>
+        <p:style>
+          <a:lnRef idx="2">
+            <a:schemeClr val="accent1">
+              <a:shade val="50000"/>
+            </a:schemeClr>
+          </a:lnRef>
+          <a:fillRef idx="1">
+            <a:schemeClr val="accent1"/>
+          </a:fillRef>
+          <a:effectRef idx="0">
+            <a:schemeClr val="accent1"/>
+          </a:effectRef>
+          <a:fontRef idx="minor">
+            <a:schemeClr val="lt1"/>
+          </a:fontRef>
+        </p:style>
+        <p:txBody>
+          <a:bodyPr rtlCol="0" anchor="ctr"/>
+          <a:lstStyle/>
+          <a:p>
+            <a:pPr algn="ctr"/>
+            <a:r>
+              <a:rPr lang="en-US" altLang="zh-CN" dirty="0">
+                <a:solidFill>
+                  <a:schemeClr val="tx1"/>
+                </a:solidFill>
+                <a:latin typeface="Times New Roman" panose="02020603050405020304" pitchFamily="18" charset="0"/>
+                <a:cs typeface="Times New Roman" panose="02020603050405020304" pitchFamily="18" charset="0"/>
+              </a:rPr>
+              <a:t>E</a:t>
+            </a:r>
+            <a:endParaRPr lang="zh-CN" altLang="en-US" dirty="0">
+              <a:solidFill>
+                <a:schemeClr val="tx1"/>
+              </a:solidFill>
+              <a:latin typeface="Times New Roman" panose="02020603050405020304" pitchFamily="18" charset="0"/>
+              <a:cs typeface="Times New Roman" panose="02020603050405020304" pitchFamily="18" charset="0"/>
+            </a:endParaRPr>
+          </a:p>
+        </p:txBody>
+      </p:sp>
+      <p:cxnSp>
+        <p:nvCxnSpPr>
+          <p:cNvPr id="18" name="直接连接符 17">
+            <a:extLst>
+              <a:ext uri="{FF2B5EF4-FFF2-40B4-BE49-F238E27FC236}">
+                <a16:creationId xmlns:a16="http://schemas.microsoft.com/office/drawing/2014/main" id="{9ED39D1B-463E-0418-6424-6EEA05687BCB}"/>
+              </a:ext>
+            </a:extLst>
+          </p:cNvPr>
+          <p:cNvCxnSpPr>
+            <a:cxnSpLocks/>
+          </p:cNvCxnSpPr>
+          <p:nvPr/>
+        </p:nvCxnSpPr>
+        <p:spPr>
+          <a:xfrm flipH="1" flipV="1">
+            <a:off x="2599062" y="1403358"/>
+            <a:ext cx="321887" cy="652082"/>
+          </a:xfrm>
+          <a:prstGeom prst="line">
+            <a:avLst/>
+          </a:prstGeom>
+          <a:ln>
+            <a:tailEnd type="none" w="lg" len="lg"/>
+          </a:ln>
+        </p:spPr>
+        <p:style>
+          <a:lnRef idx="1">
+            <a:schemeClr val="dk1"/>
+          </a:lnRef>
+          <a:fillRef idx="0">
+            <a:schemeClr val="dk1"/>
+          </a:fillRef>
+          <a:effectRef idx="0">
+            <a:schemeClr val="dk1"/>
+          </a:effectRef>
+          <a:fontRef idx="minor">
+            <a:schemeClr val="tx1"/>
+          </a:fontRef>
+        </p:style>
+      </p:cxnSp>
+      <p:cxnSp>
+        <p:nvCxnSpPr>
+          <p:cNvPr id="19" name="直接连接符 18">
+            <a:extLst>
+              <a:ext uri="{FF2B5EF4-FFF2-40B4-BE49-F238E27FC236}">
+                <a16:creationId xmlns:a16="http://schemas.microsoft.com/office/drawing/2014/main" id="{E4707A24-1168-8EA9-309C-233D78D7A224}"/>
+              </a:ext>
+            </a:extLst>
+          </p:cNvPr>
+          <p:cNvCxnSpPr>
+            <a:cxnSpLocks/>
+          </p:cNvCxnSpPr>
+          <p:nvPr/>
+        </p:nvCxnSpPr>
+        <p:spPr>
+          <a:xfrm>
+            <a:off x="1852145" y="2441198"/>
+            <a:ext cx="686691" cy="41459"/>
+          </a:xfrm>
+          <a:prstGeom prst="line">
+            <a:avLst/>
+          </a:prstGeom>
+          <a:ln>
+            <a:tailEnd type="none" w="lg" len="lg"/>
+          </a:ln>
+        </p:spPr>
+        <p:style>
+          <a:lnRef idx="1">
+            <a:schemeClr val="dk1"/>
+          </a:lnRef>
+          <a:fillRef idx="0">
+            <a:schemeClr val="dk1"/>
+          </a:fillRef>
+          <a:effectRef idx="0">
+            <a:schemeClr val="dk1"/>
+          </a:effectRef>
+          <a:fontRef idx="minor">
+            <a:schemeClr val="tx1"/>
+          </a:fontRef>
+        </p:style>
+      </p:cxnSp>
+      <p:cxnSp>
+        <p:nvCxnSpPr>
+          <p:cNvPr id="20" name="直接连接符 19">
+            <a:extLst>
+              <a:ext uri="{FF2B5EF4-FFF2-40B4-BE49-F238E27FC236}">
+                <a16:creationId xmlns:a16="http://schemas.microsoft.com/office/drawing/2014/main" id="{9FF12AD6-3DF2-E6EC-CC4A-6122095DE89E}"/>
+              </a:ext>
+            </a:extLst>
+          </p:cNvPr>
+          <p:cNvCxnSpPr>
+            <a:cxnSpLocks/>
+          </p:cNvCxnSpPr>
+          <p:nvPr/>
+        </p:nvCxnSpPr>
+        <p:spPr>
+          <a:xfrm>
+            <a:off x="1707030" y="2664543"/>
+            <a:ext cx="290230" cy="790903"/>
+          </a:xfrm>
+          <a:prstGeom prst="line">
+            <a:avLst/>
+          </a:prstGeom>
+          <a:ln>
+            <a:tailEnd type="none" w="lg" len="lg"/>
+          </a:ln>
+        </p:spPr>
+        <p:style>
+          <a:lnRef idx="1">
+            <a:schemeClr val="dk1"/>
+          </a:lnRef>
+          <a:fillRef idx="0">
+            <a:schemeClr val="dk1"/>
+          </a:fillRef>
+          <a:effectRef idx="0">
+            <a:schemeClr val="dk1"/>
+          </a:effectRef>
+          <a:fontRef idx="minor">
+            <a:schemeClr val="tx1"/>
+          </a:fontRef>
+        </p:style>
+      </p:cxnSp>
+      <p:cxnSp>
+        <p:nvCxnSpPr>
+          <p:cNvPr id="22" name="直接连接符 21">
+            <a:extLst>
+              <a:ext uri="{FF2B5EF4-FFF2-40B4-BE49-F238E27FC236}">
+                <a16:creationId xmlns:a16="http://schemas.microsoft.com/office/drawing/2014/main" id="{10D47F90-B897-54AC-05D8-D1D02337D5A1}"/>
+              </a:ext>
+            </a:extLst>
+          </p:cNvPr>
+          <p:cNvCxnSpPr>
+            <a:cxnSpLocks/>
+          </p:cNvCxnSpPr>
+          <p:nvPr/>
+        </p:nvCxnSpPr>
+        <p:spPr>
+          <a:xfrm>
+            <a:off x="895340" y="3874227"/>
+            <a:ext cx="864154" cy="50449"/>
+          </a:xfrm>
+          <a:prstGeom prst="line">
+            <a:avLst/>
+          </a:prstGeom>
+          <a:ln>
+            <a:tailEnd type="none" w="lg" len="lg"/>
+          </a:ln>
+        </p:spPr>
+        <p:style>
+          <a:lnRef idx="1">
+            <a:schemeClr val="dk1"/>
+          </a:lnRef>
+          <a:fillRef idx="0">
+            <a:schemeClr val="dk1"/>
+          </a:fillRef>
+          <a:effectRef idx="0">
+            <a:schemeClr val="dk1"/>
+          </a:effectRef>
+          <a:fontRef idx="minor">
+            <a:schemeClr val="tx1"/>
+          </a:fontRef>
+        </p:style>
+      </p:cxnSp>
+      <p:cxnSp>
+        <p:nvCxnSpPr>
+          <p:cNvPr id="23" name="直接连接符 22">
+            <a:extLst>
+              <a:ext uri="{FF2B5EF4-FFF2-40B4-BE49-F238E27FC236}">
+                <a16:creationId xmlns:a16="http://schemas.microsoft.com/office/drawing/2014/main" id="{11CE0A2F-6E34-330B-59AF-D50E7832CABC}"/>
+              </a:ext>
+            </a:extLst>
+          </p:cNvPr>
+          <p:cNvCxnSpPr>
+            <a:cxnSpLocks/>
+          </p:cNvCxnSpPr>
+          <p:nvPr/>
+        </p:nvCxnSpPr>
+        <p:spPr>
+          <a:xfrm flipV="1">
+            <a:off x="771816" y="2747162"/>
+            <a:ext cx="550098" cy="708284"/>
+          </a:xfrm>
+          <a:prstGeom prst="line">
+            <a:avLst/>
+          </a:prstGeom>
+          <a:ln>
+            <a:tailEnd type="none" w="lg" len="lg"/>
+          </a:ln>
+        </p:spPr>
+        <p:style>
+          <a:lnRef idx="1">
+            <a:schemeClr val="dk1"/>
+          </a:lnRef>
+          <a:fillRef idx="0">
+            <a:schemeClr val="dk1"/>
+          </a:fillRef>
+          <a:effectRef idx="0">
+            <a:schemeClr val="dk1"/>
+          </a:effectRef>
+          <a:fontRef idx="minor">
+            <a:schemeClr val="tx1"/>
+          </a:fontRef>
+        </p:style>
+      </p:cxnSp>
+      <p:cxnSp>
+        <p:nvCxnSpPr>
+          <p:cNvPr id="30" name="直接连接符 29">
+            <a:extLst>
+              <a:ext uri="{FF2B5EF4-FFF2-40B4-BE49-F238E27FC236}">
+                <a16:creationId xmlns:a16="http://schemas.microsoft.com/office/drawing/2014/main" id="{9E688FB3-A9AE-18DC-BF7D-EF112EAA31AA}"/>
+              </a:ext>
+            </a:extLst>
+          </p:cNvPr>
+          <p:cNvCxnSpPr>
+            <a:cxnSpLocks/>
+          </p:cNvCxnSpPr>
+          <p:nvPr/>
+        </p:nvCxnSpPr>
+        <p:spPr>
+          <a:xfrm flipH="1" flipV="1">
+            <a:off x="8424629" y="4437638"/>
+            <a:ext cx="246405" cy="354142"/>
+          </a:xfrm>
+          <a:prstGeom prst="line">
+            <a:avLst/>
+          </a:prstGeom>
+          <a:ln>
+            <a:tailEnd type="none" w="lg" len="lg"/>
+          </a:ln>
+        </p:spPr>
+        <p:style>
+          <a:lnRef idx="1">
+            <a:schemeClr val="dk1"/>
+          </a:lnRef>
+          <a:fillRef idx="0">
+            <a:schemeClr val="dk1"/>
+          </a:fillRef>
+          <a:effectRef idx="0">
+            <a:schemeClr val="dk1"/>
+          </a:effectRef>
+          <a:fontRef idx="minor">
+            <a:schemeClr val="tx1"/>
+          </a:fontRef>
+        </p:style>
+      </p:cxnSp>
+      <p:cxnSp>
+        <p:nvCxnSpPr>
+          <p:cNvPr id="31" name="直接连接符 30">
+            <a:extLst>
+              <a:ext uri="{FF2B5EF4-FFF2-40B4-BE49-F238E27FC236}">
+                <a16:creationId xmlns:a16="http://schemas.microsoft.com/office/drawing/2014/main" id="{CAAC8543-867B-86BE-9AD2-10F615B700DE}"/>
+              </a:ext>
+            </a:extLst>
+          </p:cNvPr>
+          <p:cNvCxnSpPr>
+            <a:cxnSpLocks/>
+          </p:cNvCxnSpPr>
+          <p:nvPr/>
+        </p:nvCxnSpPr>
+        <p:spPr>
+          <a:xfrm flipH="1" flipV="1">
+            <a:off x="7770888" y="3472206"/>
+            <a:ext cx="223989" cy="374807"/>
+          </a:xfrm>
+          <a:prstGeom prst="line">
+            <a:avLst/>
+          </a:prstGeom>
+          <a:ln>
+            <a:tailEnd type="none" w="lg" len="lg"/>
+          </a:ln>
+        </p:spPr>
+        <p:style>
+          <a:lnRef idx="1">
+            <a:schemeClr val="dk1"/>
+          </a:lnRef>
+          <a:fillRef idx="0">
+            <a:schemeClr val="dk1"/>
+          </a:fillRef>
+          <a:effectRef idx="0">
+            <a:schemeClr val="dk1"/>
+          </a:effectRef>
+          <a:fontRef idx="minor">
+            <a:schemeClr val="tx1"/>
+          </a:fontRef>
+        </p:style>
+      </p:cxnSp>
+      <p:cxnSp>
+        <p:nvCxnSpPr>
+          <p:cNvPr id="32" name="直接连接符 31">
+            <a:extLst>
+              <a:ext uri="{FF2B5EF4-FFF2-40B4-BE49-F238E27FC236}">
+                <a16:creationId xmlns:a16="http://schemas.microsoft.com/office/drawing/2014/main" id="{F2C7F319-C154-5F4D-9A96-4A4E123485D7}"/>
+              </a:ext>
+            </a:extLst>
+          </p:cNvPr>
+          <p:cNvCxnSpPr>
+            <a:cxnSpLocks/>
+          </p:cNvCxnSpPr>
+          <p:nvPr/>
+        </p:nvCxnSpPr>
+        <p:spPr>
+          <a:xfrm flipV="1">
+            <a:off x="7430351" y="2257679"/>
+            <a:ext cx="257385" cy="499298"/>
+          </a:xfrm>
+          <a:prstGeom prst="line">
+            <a:avLst/>
+          </a:prstGeom>
+          <a:ln>
+            <a:tailEnd type="none" w="lg" len="lg"/>
+          </a:ln>
+        </p:spPr>
+        <p:style>
+          <a:lnRef idx="1">
+            <a:schemeClr val="dk1"/>
+          </a:lnRef>
+          <a:fillRef idx="0">
+            <a:schemeClr val="dk1"/>
+          </a:fillRef>
+          <a:effectRef idx="0">
+            <a:schemeClr val="dk1"/>
+          </a:effectRef>
+          <a:fontRef idx="minor">
+            <a:schemeClr val="tx1"/>
+          </a:fontRef>
+        </p:style>
+      </p:cxnSp>
+      <p:cxnSp>
+        <p:nvCxnSpPr>
+          <p:cNvPr id="33" name="直接连接符 32">
+            <a:extLst>
+              <a:ext uri="{FF2B5EF4-FFF2-40B4-BE49-F238E27FC236}">
+                <a16:creationId xmlns:a16="http://schemas.microsoft.com/office/drawing/2014/main" id="{28B2F7B3-7434-59A9-9857-C6A7C4131F28}"/>
+              </a:ext>
+            </a:extLst>
+          </p:cNvPr>
+          <p:cNvCxnSpPr>
+            <a:cxnSpLocks/>
+          </p:cNvCxnSpPr>
+          <p:nvPr/>
+        </p:nvCxnSpPr>
+        <p:spPr>
+          <a:xfrm flipV="1">
+            <a:off x="6587540" y="3396119"/>
+            <a:ext cx="550098" cy="708284"/>
+          </a:xfrm>
+          <a:prstGeom prst="line">
+            <a:avLst/>
+          </a:prstGeom>
+          <a:ln>
+            <a:tailEnd type="none" w="lg" len="lg"/>
+          </a:ln>
+        </p:spPr>
+        <p:style>
+          <a:lnRef idx="1">
+            <a:schemeClr val="dk1"/>
+          </a:lnRef>
+          <a:fillRef idx="0">
+            <a:schemeClr val="dk1"/>
+          </a:fillRef>
+          <a:effectRef idx="0">
+            <a:schemeClr val="dk1"/>
+          </a:effectRef>
+          <a:fontRef idx="minor">
+            <a:schemeClr val="tx1"/>
+          </a:fontRef>
+        </p:style>
+      </p:cxnSp>
+      <p:sp>
+        <p:nvSpPr>
+          <p:cNvPr id="40" name="椭圆 39">
+            <a:extLst>
+              <a:ext uri="{FF2B5EF4-FFF2-40B4-BE49-F238E27FC236}">
+                <a16:creationId xmlns:a16="http://schemas.microsoft.com/office/drawing/2014/main" id="{7650651E-A13C-0960-1B9C-208DB0B1AB42}"/>
+              </a:ext>
+            </a:extLst>
+          </p:cNvPr>
+          <p:cNvSpPr/>
+          <p:nvPr/>
+        </p:nvSpPr>
+        <p:spPr>
+          <a:xfrm>
+            <a:off x="10102605" y="5978247"/>
+            <a:ext cx="548640" cy="548640"/>
+          </a:xfrm>
+          <a:prstGeom prst="ellipse">
+            <a:avLst/>
+          </a:prstGeom>
+          <a:noFill/>
+          <a:ln>
+            <a:solidFill>
+              <a:schemeClr val="tx1"/>
+            </a:solidFill>
+          </a:ln>
+        </p:spPr>
+        <p:style>
+          <a:lnRef idx="2">
+            <a:schemeClr val="accent1">
+              <a:shade val="50000"/>
+            </a:schemeClr>
+          </a:lnRef>
+          <a:fillRef idx="1">
+            <a:schemeClr val="accent1"/>
+          </a:fillRef>
+          <a:effectRef idx="0">
+            <a:schemeClr val="accent1"/>
+          </a:effectRef>
+          <a:fontRef idx="minor">
+            <a:schemeClr val="lt1"/>
+          </a:fontRef>
+        </p:style>
+        <p:txBody>
+          <a:bodyPr rtlCol="0" anchor="ctr"/>
+          <a:lstStyle/>
+          <a:p>
+            <a:pPr algn="ctr"/>
+            <a:r>
+              <a:rPr lang="en-US" altLang="zh-CN" dirty="0">
+                <a:solidFill>
+                  <a:schemeClr val="tx1"/>
+                </a:solidFill>
+                <a:latin typeface="Times New Roman" panose="02020603050405020304" pitchFamily="18" charset="0"/>
+                <a:cs typeface="Times New Roman" panose="02020603050405020304" pitchFamily="18" charset="0"/>
+              </a:rPr>
+              <a:t>B</a:t>
+            </a:r>
+            <a:endParaRPr lang="zh-CN" altLang="en-US" dirty="0">
+              <a:solidFill>
+                <a:schemeClr val="tx1"/>
+              </a:solidFill>
+              <a:latin typeface="Times New Roman" panose="02020603050405020304" pitchFamily="18" charset="0"/>
+              <a:cs typeface="Times New Roman" panose="02020603050405020304" pitchFamily="18" charset="0"/>
+            </a:endParaRPr>
+          </a:p>
+        </p:txBody>
+      </p:sp>
+      <p:cxnSp>
+        <p:nvCxnSpPr>
+          <p:cNvPr id="41" name="直接连接符 40">
+            <a:extLst>
+              <a:ext uri="{FF2B5EF4-FFF2-40B4-BE49-F238E27FC236}">
+                <a16:creationId xmlns:a16="http://schemas.microsoft.com/office/drawing/2014/main" id="{AA913E42-D9E6-6D8C-8C93-867AA2A609BC}"/>
+              </a:ext>
+            </a:extLst>
+          </p:cNvPr>
+          <p:cNvCxnSpPr>
+            <a:cxnSpLocks/>
+            <a:stCxn id="40" idx="1"/>
+          </p:cNvCxnSpPr>
+          <p:nvPr/>
+        </p:nvCxnSpPr>
+        <p:spPr>
+          <a:xfrm flipH="1" flipV="1">
+            <a:off x="9111018" y="5318462"/>
+            <a:ext cx="1071933" cy="740131"/>
+          </a:xfrm>
+          <a:prstGeom prst="line">
+            <a:avLst/>
+          </a:prstGeom>
+          <a:ln>
+            <a:solidFill>
+              <a:srgbClr val="FF0000"/>
+            </a:solidFill>
+            <a:prstDash val="lgDashDot"/>
+            <a:tailEnd type="none" w="lg" len="lg"/>
+          </a:ln>
+        </p:spPr>
+        <p:style>
+          <a:lnRef idx="1">
+            <a:schemeClr val="dk1"/>
+          </a:lnRef>
+          <a:fillRef idx="0">
+            <a:schemeClr val="dk1"/>
+          </a:fillRef>
+          <a:effectRef idx="0">
+            <a:schemeClr val="dk1"/>
+          </a:effectRef>
+          <a:fontRef idx="minor">
+            <a:schemeClr val="tx1"/>
+          </a:fontRef>
+        </p:style>
+      </p:cxnSp>
+      <p:sp>
+        <p:nvSpPr>
+          <p:cNvPr id="43" name="椭圆 42">
+            <a:extLst>
+              <a:ext uri="{FF2B5EF4-FFF2-40B4-BE49-F238E27FC236}">
+                <a16:creationId xmlns:a16="http://schemas.microsoft.com/office/drawing/2014/main" id="{73712781-47AB-D1AE-6E58-1972D87AE617}"/>
+              </a:ext>
+            </a:extLst>
+          </p:cNvPr>
+          <p:cNvSpPr/>
+          <p:nvPr/>
+        </p:nvSpPr>
+        <p:spPr>
+          <a:xfrm>
+            <a:off x="4624297" y="5703927"/>
+            <a:ext cx="548640" cy="548640"/>
+          </a:xfrm>
+          <a:prstGeom prst="ellipse">
+            <a:avLst/>
+          </a:prstGeom>
+          <a:noFill/>
+          <a:ln>
+            <a:solidFill>
+              <a:schemeClr val="tx1"/>
+            </a:solidFill>
+          </a:ln>
+        </p:spPr>
+        <p:style>
+          <a:lnRef idx="2">
+            <a:schemeClr val="accent1">
+              <a:shade val="50000"/>
+            </a:schemeClr>
+          </a:lnRef>
+          <a:fillRef idx="1">
+            <a:schemeClr val="accent1"/>
+          </a:fillRef>
+          <a:effectRef idx="0">
+            <a:schemeClr val="accent1"/>
+          </a:effectRef>
+          <a:fontRef idx="minor">
+            <a:schemeClr val="lt1"/>
+          </a:fontRef>
+        </p:style>
+        <p:txBody>
+          <a:bodyPr rtlCol="0" anchor="ctr"/>
+          <a:lstStyle/>
+          <a:p>
+            <a:pPr algn="ctr"/>
+            <a:r>
+              <a:rPr lang="en-US" altLang="zh-CN" dirty="0">
+                <a:solidFill>
+                  <a:schemeClr val="tx1"/>
+                </a:solidFill>
+                <a:latin typeface="Times New Roman" panose="02020603050405020304" pitchFamily="18" charset="0"/>
+                <a:cs typeface="Times New Roman" panose="02020603050405020304" pitchFamily="18" charset="0"/>
+              </a:rPr>
+              <a:t>A</a:t>
+            </a:r>
+            <a:endParaRPr lang="zh-CN" altLang="en-US" dirty="0">
+              <a:solidFill>
+                <a:schemeClr val="tx1"/>
+              </a:solidFill>
+              <a:latin typeface="Times New Roman" panose="02020603050405020304" pitchFamily="18" charset="0"/>
+              <a:cs typeface="Times New Roman" panose="02020603050405020304" pitchFamily="18" charset="0"/>
+            </a:endParaRPr>
+          </a:p>
+        </p:txBody>
+      </p:sp>
+      <p:cxnSp>
+        <p:nvCxnSpPr>
+          <p:cNvPr id="44" name="直接连接符 43">
+            <a:extLst>
+              <a:ext uri="{FF2B5EF4-FFF2-40B4-BE49-F238E27FC236}">
+                <a16:creationId xmlns:a16="http://schemas.microsoft.com/office/drawing/2014/main" id="{D810E846-A6CC-0E81-BB5F-7DB2BFDF7417}"/>
+              </a:ext>
+            </a:extLst>
+          </p:cNvPr>
+          <p:cNvCxnSpPr>
+            <a:cxnSpLocks/>
+          </p:cNvCxnSpPr>
+          <p:nvPr/>
+        </p:nvCxnSpPr>
+        <p:spPr>
+          <a:xfrm flipV="1">
+            <a:off x="5172937" y="4614709"/>
+            <a:ext cx="817377" cy="1100319"/>
+          </a:xfrm>
+          <a:prstGeom prst="line">
+            <a:avLst/>
+          </a:prstGeom>
+          <a:ln>
+            <a:solidFill>
+              <a:srgbClr val="FF0000"/>
+            </a:solidFill>
+            <a:prstDash val="lgDashDot"/>
+            <a:tailEnd type="none" w="lg" len="lg"/>
+          </a:ln>
+        </p:spPr>
+        <p:style>
+          <a:lnRef idx="1">
+            <a:schemeClr val="dk1"/>
+          </a:lnRef>
+          <a:fillRef idx="0">
+            <a:schemeClr val="dk1"/>
+          </a:fillRef>
+          <a:effectRef idx="0">
+            <a:schemeClr val="dk1"/>
+          </a:effectRef>
+          <a:fontRef idx="minor">
+            <a:schemeClr val="tx1"/>
+          </a:fontRef>
+        </p:style>
+      </p:cxnSp>
+      <p:sp>
+        <p:nvSpPr>
+          <p:cNvPr id="46" name="文本框 45">
+            <a:extLst>
+              <a:ext uri="{FF2B5EF4-FFF2-40B4-BE49-F238E27FC236}">
+                <a16:creationId xmlns:a16="http://schemas.microsoft.com/office/drawing/2014/main" id="{B9EFE97C-65DC-9836-35B2-3BDDD2A7C235}"/>
+              </a:ext>
+            </a:extLst>
+          </p:cNvPr>
+          <p:cNvSpPr txBox="1"/>
+          <p:nvPr/>
+        </p:nvSpPr>
+        <p:spPr>
+          <a:xfrm>
+            <a:off x="3945470" y="615340"/>
+            <a:ext cx="2642070" cy="830997"/>
+          </a:xfrm>
+          <a:prstGeom prst="rect">
+            <a:avLst/>
+          </a:prstGeom>
+          <a:noFill/>
+        </p:spPr>
+        <p:txBody>
+          <a:bodyPr wrap="none" rtlCol="0">
+            <a:spAutoFit/>
+          </a:bodyPr>
+          <a:lstStyle/>
+          <a:p>
+            <a:r>
+              <a:rPr lang="en-US" altLang="zh-CN" sz="4800" dirty="0">
+                <a:latin typeface="Times New Roman" panose="02020603050405020304" pitchFamily="18" charset="0"/>
+                <a:cs typeface="Times New Roman" panose="02020603050405020304" pitchFamily="18" charset="0"/>
+              </a:rPr>
+              <a:t>(</a:t>
+            </a:r>
+            <a:r>
+              <a:rPr lang="en-US" altLang="zh-CN" sz="4800" dirty="0" err="1">
+                <a:latin typeface="Times New Roman" panose="02020603050405020304" pitchFamily="18" charset="0"/>
+                <a:cs typeface="Times New Roman" panose="02020603050405020304" pitchFamily="18" charset="0"/>
+              </a:rPr>
+              <a:t>dfn</a:t>
+            </a:r>
+            <a:r>
+              <a:rPr lang="en-US" altLang="zh-CN" sz="4800" dirty="0">
+                <a:latin typeface="Times New Roman" panose="02020603050405020304" pitchFamily="18" charset="0"/>
+                <a:cs typeface="Times New Roman" panose="02020603050405020304" pitchFamily="18" charset="0"/>
+              </a:rPr>
+              <a:t>, low)</a:t>
+            </a:r>
+            <a:endParaRPr lang="zh-CN" altLang="en-US" sz="4800" dirty="0">
+              <a:latin typeface="Times New Roman" panose="02020603050405020304" pitchFamily="18" charset="0"/>
+              <a:cs typeface="Times New Roman" panose="02020603050405020304" pitchFamily="18" charset="0"/>
+            </a:endParaRPr>
+          </a:p>
+        </p:txBody>
+      </p:sp>
+      <p:sp>
+        <p:nvSpPr>
+          <p:cNvPr id="47" name="文本框 46">
+            <a:extLst>
+              <a:ext uri="{FF2B5EF4-FFF2-40B4-BE49-F238E27FC236}">
+                <a16:creationId xmlns:a16="http://schemas.microsoft.com/office/drawing/2014/main" id="{5D070F59-A940-8917-7B05-33ABF32A0DE0}"/>
+              </a:ext>
+            </a:extLst>
+          </p:cNvPr>
+          <p:cNvSpPr txBox="1"/>
+          <p:nvPr/>
+        </p:nvSpPr>
+        <p:spPr>
+          <a:xfrm>
+            <a:off x="8082227" y="1446710"/>
+            <a:ext cx="684803" cy="369332"/>
+          </a:xfrm>
+          <a:prstGeom prst="rect">
+            <a:avLst/>
+          </a:prstGeom>
+          <a:noFill/>
+        </p:spPr>
+        <p:txBody>
+          <a:bodyPr wrap="none" rtlCol="0">
+            <a:spAutoFit/>
+          </a:bodyPr>
+          <a:lstStyle/>
+          <a:p>
+            <a:r>
+              <a:rPr lang="en-US" altLang="zh-CN" dirty="0">
+                <a:latin typeface="Times New Roman" panose="02020603050405020304" pitchFamily="18" charset="0"/>
+                <a:cs typeface="Times New Roman" panose="02020603050405020304" pitchFamily="18" charset="0"/>
+              </a:rPr>
+              <a:t>(1, 1)</a:t>
+            </a:r>
+            <a:endParaRPr lang="zh-CN" altLang="en-US" dirty="0">
+              <a:latin typeface="Times New Roman" panose="02020603050405020304" pitchFamily="18" charset="0"/>
+              <a:cs typeface="Times New Roman" panose="02020603050405020304" pitchFamily="18" charset="0"/>
+            </a:endParaRPr>
+          </a:p>
+        </p:txBody>
+      </p:sp>
+      <p:sp>
+        <p:nvSpPr>
+          <p:cNvPr id="48" name="文本框 47">
+            <a:extLst>
+              <a:ext uri="{FF2B5EF4-FFF2-40B4-BE49-F238E27FC236}">
+                <a16:creationId xmlns:a16="http://schemas.microsoft.com/office/drawing/2014/main" id="{1BFF483A-5D26-0041-D96D-F3ED0044C5F7}"/>
+              </a:ext>
+            </a:extLst>
+          </p:cNvPr>
+          <p:cNvSpPr txBox="1"/>
+          <p:nvPr/>
+        </p:nvSpPr>
+        <p:spPr>
+          <a:xfrm>
+            <a:off x="6405011" y="2664543"/>
+            <a:ext cx="684803" cy="369332"/>
+          </a:xfrm>
+          <a:prstGeom prst="rect">
+            <a:avLst/>
+          </a:prstGeom>
+          <a:noFill/>
+        </p:spPr>
+        <p:txBody>
+          <a:bodyPr wrap="none" rtlCol="0">
+            <a:spAutoFit/>
+          </a:bodyPr>
+          <a:lstStyle/>
+          <a:p>
+            <a:r>
+              <a:rPr lang="en-US" altLang="zh-CN" dirty="0">
+                <a:latin typeface="Times New Roman" panose="02020603050405020304" pitchFamily="18" charset="0"/>
+                <a:cs typeface="Times New Roman" panose="02020603050405020304" pitchFamily="18" charset="0"/>
+              </a:rPr>
+              <a:t>(2, 1)</a:t>
+            </a:r>
+            <a:endParaRPr lang="zh-CN" altLang="en-US" dirty="0">
+              <a:latin typeface="Times New Roman" panose="02020603050405020304" pitchFamily="18" charset="0"/>
+              <a:cs typeface="Times New Roman" panose="02020603050405020304" pitchFamily="18" charset="0"/>
+            </a:endParaRPr>
+          </a:p>
+        </p:txBody>
+      </p:sp>
+      <p:sp>
+        <p:nvSpPr>
+          <p:cNvPr id="49" name="文本框 48">
+            <a:extLst>
+              <a:ext uri="{FF2B5EF4-FFF2-40B4-BE49-F238E27FC236}">
+                <a16:creationId xmlns:a16="http://schemas.microsoft.com/office/drawing/2014/main" id="{B07F9F8E-699A-0110-DCAB-E7633142169C}"/>
+              </a:ext>
+            </a:extLst>
+          </p:cNvPr>
+          <p:cNvSpPr txBox="1"/>
+          <p:nvPr/>
+        </p:nvSpPr>
+        <p:spPr>
+          <a:xfrm>
+            <a:off x="5164386" y="3829664"/>
+            <a:ext cx="684803" cy="369332"/>
+          </a:xfrm>
+          <a:prstGeom prst="rect">
+            <a:avLst/>
+          </a:prstGeom>
+          <a:noFill/>
+        </p:spPr>
+        <p:txBody>
+          <a:bodyPr wrap="none" rtlCol="0">
+            <a:spAutoFit/>
+          </a:bodyPr>
+          <a:lstStyle/>
+          <a:p>
+            <a:r>
+              <a:rPr lang="en-US" altLang="zh-CN" dirty="0">
+                <a:latin typeface="Times New Roman" panose="02020603050405020304" pitchFamily="18" charset="0"/>
+                <a:cs typeface="Times New Roman" panose="02020603050405020304" pitchFamily="18" charset="0"/>
+              </a:rPr>
+              <a:t>(3, 1)</a:t>
+            </a:r>
+            <a:endParaRPr lang="zh-CN" altLang="en-US" dirty="0">
+              <a:latin typeface="Times New Roman" panose="02020603050405020304" pitchFamily="18" charset="0"/>
+              <a:cs typeface="Times New Roman" panose="02020603050405020304" pitchFamily="18" charset="0"/>
+            </a:endParaRPr>
+          </a:p>
+        </p:txBody>
+      </p:sp>
+      <p:sp>
+        <p:nvSpPr>
+          <p:cNvPr id="50" name="文本框 49">
+            <a:extLst>
+              <a:ext uri="{FF2B5EF4-FFF2-40B4-BE49-F238E27FC236}">
+                <a16:creationId xmlns:a16="http://schemas.microsoft.com/office/drawing/2014/main" id="{EDB651A5-CF17-E6EE-58DB-8A2013010E46}"/>
+              </a:ext>
+            </a:extLst>
+          </p:cNvPr>
+          <p:cNvSpPr txBox="1"/>
+          <p:nvPr/>
+        </p:nvSpPr>
+        <p:spPr>
+          <a:xfrm>
+            <a:off x="8417744" y="3735071"/>
+            <a:ext cx="684803" cy="369332"/>
+          </a:xfrm>
+          <a:prstGeom prst="rect">
+            <a:avLst/>
+          </a:prstGeom>
+          <a:noFill/>
+        </p:spPr>
+        <p:txBody>
+          <a:bodyPr wrap="none" rtlCol="0">
+            <a:spAutoFit/>
+          </a:bodyPr>
+          <a:lstStyle/>
+          <a:p>
+            <a:r>
+              <a:rPr lang="en-US" altLang="zh-CN" dirty="0">
+                <a:latin typeface="Times New Roman" panose="02020603050405020304" pitchFamily="18" charset="0"/>
+                <a:cs typeface="Times New Roman" panose="02020603050405020304" pitchFamily="18" charset="0"/>
+              </a:rPr>
+              <a:t>(4, 2)</a:t>
+            </a:r>
+            <a:endParaRPr lang="zh-CN" altLang="en-US" dirty="0">
+              <a:latin typeface="Times New Roman" panose="02020603050405020304" pitchFamily="18" charset="0"/>
+              <a:cs typeface="Times New Roman" panose="02020603050405020304" pitchFamily="18" charset="0"/>
+            </a:endParaRPr>
+          </a:p>
+        </p:txBody>
+      </p:sp>
+      <p:sp>
+        <p:nvSpPr>
+          <p:cNvPr id="51" name="文本框 50">
+            <a:extLst>
+              <a:ext uri="{FF2B5EF4-FFF2-40B4-BE49-F238E27FC236}">
+                <a16:creationId xmlns:a16="http://schemas.microsoft.com/office/drawing/2014/main" id="{B22F6B16-321C-4EDF-F4F1-393406D3572B}"/>
+              </a:ext>
+            </a:extLst>
+          </p:cNvPr>
+          <p:cNvSpPr txBox="1"/>
+          <p:nvPr/>
+        </p:nvSpPr>
+        <p:spPr>
+          <a:xfrm>
+            <a:off x="9035809" y="4626682"/>
+            <a:ext cx="684803" cy="369332"/>
+          </a:xfrm>
+          <a:prstGeom prst="rect">
+            <a:avLst/>
+          </a:prstGeom>
+          <a:noFill/>
+        </p:spPr>
+        <p:txBody>
+          <a:bodyPr wrap="none" rtlCol="0">
+            <a:spAutoFit/>
+          </a:bodyPr>
+          <a:lstStyle/>
+          <a:p>
+            <a:r>
+              <a:rPr lang="en-US" altLang="zh-CN" dirty="0">
+                <a:latin typeface="Times New Roman" panose="02020603050405020304" pitchFamily="18" charset="0"/>
+                <a:cs typeface="Times New Roman" panose="02020603050405020304" pitchFamily="18" charset="0"/>
+              </a:rPr>
+              <a:t>(5, 2)</a:t>
+            </a:r>
+            <a:endParaRPr lang="zh-CN" altLang="en-US" dirty="0">
+              <a:latin typeface="Times New Roman" panose="02020603050405020304" pitchFamily="18" charset="0"/>
+              <a:cs typeface="Times New Roman" panose="02020603050405020304" pitchFamily="18" charset="0"/>
+            </a:endParaRPr>
+          </a:p>
+        </p:txBody>
+      </p:sp>
+    </p:spTree>
+    <p:extLst>
+      <p:ext uri="{BB962C8B-B14F-4D97-AF65-F5344CB8AC3E}">
+        <p14:creationId xmlns:p14="http://schemas.microsoft.com/office/powerpoint/2010/main" val="1492201674"/>
+      </p:ext>
+    </p:extLst>
+  </p:cSld>
+  <p:clrMapOvr>
+    <a:masterClrMapping/>
+  </p:clrMapOvr>
+</p:sld>
+</file>
+
 <file path=ppt/slides/slide2.xml><?xml version="1.0" encoding="utf-8"?>
 <p:sld xmlns:a="http://schemas.openxmlformats.org/drawingml/2006/main" xmlns:r="http://schemas.openxmlformats.org/officeDocument/2006/relationships" xmlns:p="http://schemas.openxmlformats.org/presentationml/2006/main">
   <p:cSld>

</xml_diff>